<commit_message>
Added a few images
</commit_message>
<xml_diff>
--- a/ML_Practices/images/ML Practices.pptx
+++ b/ML_Practices/images/ML Practices.pptx
@@ -16,10 +16,11 @@
     <p:sldId id="267" r:id="rId9"/>
     <p:sldId id="258" r:id="rId10"/>
     <p:sldId id="261" r:id="rId11"/>
-    <p:sldId id="274" r:id="rId12"/>
-    <p:sldId id="262" r:id="rId13"/>
-    <p:sldId id="263" r:id="rId14"/>
-    <p:sldId id="273" r:id="rId15"/>
+    <p:sldId id="278" r:id="rId12"/>
+    <p:sldId id="274" r:id="rId13"/>
+    <p:sldId id="262" r:id="rId14"/>
+    <p:sldId id="263" r:id="rId15"/>
+    <p:sldId id="273" r:id="rId16"/>
   </p:sldIdLst>
   <p:sldSz cx="12192000" cy="6858000"/>
   <p:notesSz cx="7103745" cy="10234295"/>
@@ -3712,6 +3713,2208 @@
         <p:nvPr/>
       </p:nvGrpSpPr>
       <p:grpSpPr/>
+      <p:grpSp>
+        <p:nvGrpSpPr>
+          <p:cNvPr id="50" name="Group 49"/>
+          <p:cNvGrpSpPr/>
+          <p:nvPr/>
+        </p:nvGrpSpPr>
+        <p:grpSpPr>
+          <a:xfrm>
+            <a:off x="603250" y="2035810"/>
+            <a:ext cx="9425799" cy="4230555"/>
+            <a:chOff x="1774" y="2073"/>
+            <a:chExt cx="14232" cy="7450"/>
+          </a:xfrm>
+        </p:grpSpPr>
+        <p:sp>
+          <p:nvSpPr>
+            <p:cNvPr id="49" name="Right Arrow Callout 48"/>
+            <p:cNvSpPr/>
+            <p:nvPr/>
+          </p:nvSpPr>
+          <p:spPr>
+            <a:xfrm>
+              <a:off x="11528" y="3748"/>
+              <a:ext cx="4478" cy="5775"/>
+            </a:xfrm>
+            <a:prstGeom prst="rightArrowCallout">
+              <a:avLst/>
+            </a:prstGeom>
+            <a:solidFill>
+              <a:schemeClr val="accent2">
+                <a:lumMod val="60000"/>
+                <a:lumOff val="40000"/>
+                <a:alpha val="0"/>
+              </a:schemeClr>
+            </a:solidFill>
+            <a:ln w="50800">
+              <a:solidFill>
+                <a:schemeClr val="accent2">
+                  <a:lumMod val="75000"/>
+                </a:schemeClr>
+              </a:solidFill>
+            </a:ln>
+          </p:spPr>
+          <p:style>
+            <a:lnRef idx="2">
+              <a:schemeClr val="accent1">
+                <a:shade val="50000"/>
+              </a:schemeClr>
+            </a:lnRef>
+            <a:fillRef idx="1">
+              <a:schemeClr val="accent1"/>
+            </a:fillRef>
+            <a:effectRef idx="0">
+              <a:schemeClr val="accent1"/>
+            </a:effectRef>
+            <a:fontRef idx="minor">
+              <a:schemeClr val="lt1"/>
+            </a:fontRef>
+          </p:style>
+          <p:txBody>
+            <a:bodyPr rtlCol="0" anchor="ctr"/>
+            <a:p>
+              <a:pPr algn="ctr"/>
+              <a:endParaRPr lang="en-US"/>
+            </a:p>
+          </p:txBody>
+        </p:sp>
+        <p:grpSp>
+          <p:nvGrpSpPr>
+            <p:cNvPr id="44" name="Group 43"/>
+            <p:cNvGrpSpPr/>
+            <p:nvPr/>
+          </p:nvGrpSpPr>
+          <p:grpSpPr>
+            <a:xfrm>
+              <a:off x="1774" y="2073"/>
+              <a:ext cx="9351" cy="7403"/>
+              <a:chOff x="3938" y="938"/>
+              <a:chExt cx="9351" cy="7403"/>
+            </a:xfrm>
+          </p:grpSpPr>
+          <p:grpSp>
+            <p:nvGrpSpPr>
+              <p:cNvPr id="39" name="Group 38"/>
+              <p:cNvGrpSpPr/>
+              <p:nvPr/>
+            </p:nvGrpSpPr>
+            <p:grpSpPr>
+              <a:xfrm>
+                <a:off x="3939" y="2613"/>
+                <a:ext cx="9350" cy="5728"/>
+                <a:chOff x="1261" y="1467"/>
+                <a:chExt cx="12727" cy="7964"/>
+              </a:xfrm>
+            </p:grpSpPr>
+            <p:grpSp>
+              <p:nvGrpSpPr>
+                <p:cNvPr id="17" name="Group 16"/>
+                <p:cNvGrpSpPr/>
+                <p:nvPr/>
+              </p:nvGrpSpPr>
+              <p:grpSpPr>
+                <a:xfrm>
+                  <a:off x="1261" y="1467"/>
+                  <a:ext cx="12727" cy="1740"/>
+                  <a:chOff x="1261" y="1467"/>
+                  <a:chExt cx="12727" cy="1740"/>
+                </a:xfrm>
+              </p:grpSpPr>
+              <p:sp>
+                <p:nvSpPr>
+                  <p:cNvPr id="8" name="Rounded Rectangle 7"/>
+                  <p:cNvSpPr/>
+                  <p:nvPr/>
+                </p:nvSpPr>
+                <p:spPr>
+                  <a:xfrm>
+                    <a:off x="1261" y="1467"/>
+                    <a:ext cx="2898" cy="1740"/>
+                  </a:xfrm>
+                  <a:prstGeom prst="roundRect">
+                    <a:avLst/>
+                  </a:prstGeom>
+                  <a:solidFill>
+                    <a:schemeClr val="accent6">
+                      <a:lumMod val="60000"/>
+                      <a:lumOff val="40000"/>
+                    </a:schemeClr>
+                  </a:solidFill>
+                  <a:ln w="50800" cmpd="sng">
+                    <a:solidFill>
+                      <a:schemeClr val="accent6">
+                        <a:lumMod val="75000"/>
+                      </a:schemeClr>
+                    </a:solidFill>
+                    <a:prstDash val="solid"/>
+                  </a:ln>
+                </p:spPr>
+                <p:style>
+                  <a:lnRef idx="2">
+                    <a:schemeClr val="accent1">
+                      <a:shade val="50000"/>
+                    </a:schemeClr>
+                  </a:lnRef>
+                  <a:fillRef idx="1">
+                    <a:schemeClr val="accent1"/>
+                  </a:fillRef>
+                  <a:effectRef idx="0">
+                    <a:schemeClr val="accent1"/>
+                  </a:effectRef>
+                  <a:fontRef idx="minor">
+                    <a:schemeClr val="lt1"/>
+                  </a:fontRef>
+                </p:style>
+                <p:txBody>
+                  <a:bodyPr rtlCol="0" anchor="ctr"/>
+                  <a:p>
+                    <a:pPr algn="ctr"/>
+                    <a:endParaRPr lang="en-US" altLang="en-US" i="1">
+                      <a:solidFill>
+                        <a:schemeClr val="accent1">
+                          <a:lumMod val="50000"/>
+                        </a:schemeClr>
+                      </a:solidFill>
+                      <a:sym typeface="+mn-ea"/>
+                    </a:endParaRPr>
+                  </a:p>
+                </p:txBody>
+              </p:sp>
+              <p:sp>
+                <p:nvSpPr>
+                  <p:cNvPr id="2" name="Rounded Rectangle 1"/>
+                  <p:cNvSpPr/>
+                  <p:nvPr/>
+                </p:nvSpPr>
+                <p:spPr>
+                  <a:xfrm>
+                    <a:off x="4530" y="1467"/>
+                    <a:ext cx="2898" cy="1740"/>
+                  </a:xfrm>
+                  <a:prstGeom prst="roundRect">
+                    <a:avLst/>
+                  </a:prstGeom>
+                  <a:solidFill>
+                    <a:schemeClr val="accent6">
+                      <a:lumMod val="60000"/>
+                      <a:lumOff val="40000"/>
+                    </a:schemeClr>
+                  </a:solidFill>
+                  <a:ln w="50800" cmpd="sng">
+                    <a:solidFill>
+                      <a:schemeClr val="accent6">
+                        <a:lumMod val="75000"/>
+                      </a:schemeClr>
+                    </a:solidFill>
+                    <a:prstDash val="solid"/>
+                  </a:ln>
+                </p:spPr>
+                <p:style>
+                  <a:lnRef idx="2">
+                    <a:schemeClr val="accent1">
+                      <a:shade val="50000"/>
+                    </a:schemeClr>
+                  </a:lnRef>
+                  <a:fillRef idx="1">
+                    <a:schemeClr val="accent1"/>
+                  </a:fillRef>
+                  <a:effectRef idx="0">
+                    <a:schemeClr val="accent1"/>
+                  </a:effectRef>
+                  <a:fontRef idx="minor">
+                    <a:schemeClr val="lt1"/>
+                  </a:fontRef>
+                </p:style>
+                <p:txBody>
+                  <a:bodyPr rtlCol="0" anchor="ctr"/>
+                  <a:p>
+                    <a:pPr algn="ctr"/>
+                    <a:endParaRPr lang="en-US" altLang="en-US" i="1">
+                      <a:solidFill>
+                        <a:schemeClr val="accent1">
+                          <a:lumMod val="50000"/>
+                        </a:schemeClr>
+                      </a:solidFill>
+                      <a:sym typeface="+mn-ea"/>
+                    </a:endParaRPr>
+                  </a:p>
+                </p:txBody>
+              </p:sp>
+              <p:sp>
+                <p:nvSpPr>
+                  <p:cNvPr id="3" name="Rounded Rectangle 2"/>
+                  <p:cNvSpPr/>
+                  <p:nvPr/>
+                </p:nvSpPr>
+                <p:spPr>
+                  <a:xfrm>
+                    <a:off x="7800" y="1467"/>
+                    <a:ext cx="2898" cy="1740"/>
+                  </a:xfrm>
+                  <a:prstGeom prst="roundRect">
+                    <a:avLst/>
+                  </a:prstGeom>
+                  <a:solidFill>
+                    <a:schemeClr val="accent6">
+                      <a:lumMod val="60000"/>
+                      <a:lumOff val="40000"/>
+                    </a:schemeClr>
+                  </a:solidFill>
+                  <a:ln w="50800" cmpd="sng">
+                    <a:solidFill>
+                      <a:schemeClr val="accent6">
+                        <a:lumMod val="75000"/>
+                      </a:schemeClr>
+                    </a:solidFill>
+                    <a:prstDash val="solid"/>
+                  </a:ln>
+                </p:spPr>
+                <p:style>
+                  <a:lnRef idx="2">
+                    <a:schemeClr val="accent1">
+                      <a:shade val="50000"/>
+                    </a:schemeClr>
+                  </a:lnRef>
+                  <a:fillRef idx="1">
+                    <a:schemeClr val="accent1"/>
+                  </a:fillRef>
+                  <a:effectRef idx="0">
+                    <a:schemeClr val="accent1"/>
+                  </a:effectRef>
+                  <a:fontRef idx="minor">
+                    <a:schemeClr val="lt1"/>
+                  </a:fontRef>
+                </p:style>
+                <p:txBody>
+                  <a:bodyPr rtlCol="0" anchor="ctr"/>
+                  <a:p>
+                    <a:pPr algn="ctr"/>
+                    <a:endParaRPr lang="en-US" altLang="en-US" i="1">
+                      <a:solidFill>
+                        <a:schemeClr val="accent1">
+                          <a:lumMod val="50000"/>
+                        </a:schemeClr>
+                      </a:solidFill>
+                      <a:sym typeface="+mn-ea"/>
+                    </a:endParaRPr>
+                  </a:p>
+                </p:txBody>
+              </p:sp>
+              <p:sp>
+                <p:nvSpPr>
+                  <p:cNvPr id="15" name="Rounded Rectangle 14"/>
+                  <p:cNvSpPr/>
+                  <p:nvPr/>
+                </p:nvSpPr>
+                <p:spPr>
+                  <a:xfrm>
+                    <a:off x="11090" y="1467"/>
+                    <a:ext cx="2898" cy="1740"/>
+                  </a:xfrm>
+                  <a:prstGeom prst="roundRect">
+                    <a:avLst/>
+                  </a:prstGeom>
+                  <a:solidFill>
+                    <a:schemeClr val="accent2">
+                      <a:lumMod val="60000"/>
+                      <a:lumOff val="40000"/>
+                    </a:schemeClr>
+                  </a:solidFill>
+                  <a:ln w="50800" cmpd="sng">
+                    <a:solidFill>
+                      <a:schemeClr val="accent2">
+                        <a:lumMod val="75000"/>
+                      </a:schemeClr>
+                    </a:solidFill>
+                    <a:prstDash val="solid"/>
+                  </a:ln>
+                </p:spPr>
+                <p:style>
+                  <a:lnRef idx="2">
+                    <a:schemeClr val="accent1">
+                      <a:shade val="50000"/>
+                    </a:schemeClr>
+                  </a:lnRef>
+                  <a:fillRef idx="1">
+                    <a:schemeClr val="accent1"/>
+                  </a:fillRef>
+                  <a:effectRef idx="0">
+                    <a:schemeClr val="accent1"/>
+                  </a:effectRef>
+                  <a:fontRef idx="minor">
+                    <a:schemeClr val="lt1"/>
+                  </a:fontRef>
+                </p:style>
+                <p:txBody>
+                  <a:bodyPr rtlCol="0" anchor="ctr"/>
+                  <a:p>
+                    <a:pPr algn="ctr"/>
+                    <a:endParaRPr lang="en-US" altLang="en-US" i="1">
+                      <a:solidFill>
+                        <a:schemeClr val="accent1">
+                          <a:lumMod val="50000"/>
+                        </a:schemeClr>
+                      </a:solidFill>
+                      <a:sym typeface="+mn-ea"/>
+                    </a:endParaRPr>
+                  </a:p>
+                </p:txBody>
+              </p:sp>
+            </p:grpSp>
+            <p:grpSp>
+              <p:nvGrpSpPr>
+                <p:cNvPr id="18" name="Group 17"/>
+                <p:cNvGrpSpPr/>
+                <p:nvPr/>
+              </p:nvGrpSpPr>
+              <p:grpSpPr>
+                <a:xfrm>
+                  <a:off x="1261" y="3541"/>
+                  <a:ext cx="12727" cy="1740"/>
+                  <a:chOff x="1261" y="1467"/>
+                  <a:chExt cx="12727" cy="1740"/>
+                </a:xfrm>
+              </p:grpSpPr>
+              <p:sp>
+                <p:nvSpPr>
+                  <p:cNvPr id="19" name="Rounded Rectangle 18"/>
+                  <p:cNvSpPr/>
+                  <p:nvPr/>
+                </p:nvSpPr>
+                <p:spPr>
+                  <a:xfrm>
+                    <a:off x="1261" y="1467"/>
+                    <a:ext cx="2898" cy="1740"/>
+                  </a:xfrm>
+                  <a:prstGeom prst="roundRect">
+                    <a:avLst/>
+                  </a:prstGeom>
+                  <a:solidFill>
+                    <a:schemeClr val="accent6">
+                      <a:lumMod val="60000"/>
+                      <a:lumOff val="40000"/>
+                    </a:schemeClr>
+                  </a:solidFill>
+                  <a:ln w="50800" cmpd="sng">
+                    <a:solidFill>
+                      <a:schemeClr val="accent6">
+                        <a:lumMod val="75000"/>
+                      </a:schemeClr>
+                    </a:solidFill>
+                    <a:prstDash val="solid"/>
+                  </a:ln>
+                </p:spPr>
+                <p:style>
+                  <a:lnRef idx="2">
+                    <a:schemeClr val="accent1">
+                      <a:shade val="50000"/>
+                    </a:schemeClr>
+                  </a:lnRef>
+                  <a:fillRef idx="1">
+                    <a:schemeClr val="accent1"/>
+                  </a:fillRef>
+                  <a:effectRef idx="0">
+                    <a:schemeClr val="accent1"/>
+                  </a:effectRef>
+                  <a:fontRef idx="minor">
+                    <a:schemeClr val="lt1"/>
+                  </a:fontRef>
+                </p:style>
+                <p:txBody>
+                  <a:bodyPr rtlCol="0" anchor="ctr"/>
+                  <a:p>
+                    <a:pPr algn="ctr"/>
+                    <a:endParaRPr lang="en-US" altLang="en-US" i="1">
+                      <a:solidFill>
+                        <a:schemeClr val="accent1">
+                          <a:lumMod val="50000"/>
+                        </a:schemeClr>
+                      </a:solidFill>
+                      <a:sym typeface="+mn-ea"/>
+                    </a:endParaRPr>
+                  </a:p>
+                </p:txBody>
+              </p:sp>
+              <p:sp>
+                <p:nvSpPr>
+                  <p:cNvPr id="20" name="Rounded Rectangle 19"/>
+                  <p:cNvSpPr/>
+                  <p:nvPr/>
+                </p:nvSpPr>
+                <p:spPr>
+                  <a:xfrm>
+                    <a:off x="4530" y="1467"/>
+                    <a:ext cx="2898" cy="1740"/>
+                  </a:xfrm>
+                  <a:prstGeom prst="roundRect">
+                    <a:avLst/>
+                  </a:prstGeom>
+                  <a:solidFill>
+                    <a:schemeClr val="accent6">
+                      <a:lumMod val="60000"/>
+                      <a:lumOff val="40000"/>
+                    </a:schemeClr>
+                  </a:solidFill>
+                  <a:ln w="50800" cmpd="sng">
+                    <a:solidFill>
+                      <a:schemeClr val="accent6">
+                        <a:lumMod val="75000"/>
+                      </a:schemeClr>
+                    </a:solidFill>
+                    <a:prstDash val="solid"/>
+                  </a:ln>
+                </p:spPr>
+                <p:style>
+                  <a:lnRef idx="2">
+                    <a:schemeClr val="accent1">
+                      <a:shade val="50000"/>
+                    </a:schemeClr>
+                  </a:lnRef>
+                  <a:fillRef idx="1">
+                    <a:schemeClr val="accent1"/>
+                  </a:fillRef>
+                  <a:effectRef idx="0">
+                    <a:schemeClr val="accent1"/>
+                  </a:effectRef>
+                  <a:fontRef idx="minor">
+                    <a:schemeClr val="lt1"/>
+                  </a:fontRef>
+                </p:style>
+                <p:txBody>
+                  <a:bodyPr rtlCol="0" anchor="ctr"/>
+                  <a:p>
+                    <a:pPr algn="ctr"/>
+                    <a:endParaRPr lang="en-US" altLang="en-US" i="1">
+                      <a:solidFill>
+                        <a:schemeClr val="accent1">
+                          <a:lumMod val="50000"/>
+                        </a:schemeClr>
+                      </a:solidFill>
+                      <a:sym typeface="+mn-ea"/>
+                    </a:endParaRPr>
+                  </a:p>
+                </p:txBody>
+              </p:sp>
+              <p:sp>
+                <p:nvSpPr>
+                  <p:cNvPr id="22" name="Rounded Rectangle 21"/>
+                  <p:cNvSpPr/>
+                  <p:nvPr/>
+                </p:nvSpPr>
+                <p:spPr>
+                  <a:xfrm>
+                    <a:off x="11090" y="1467"/>
+                    <a:ext cx="2898" cy="1740"/>
+                  </a:xfrm>
+                  <a:prstGeom prst="roundRect">
+                    <a:avLst/>
+                  </a:prstGeom>
+                  <a:solidFill>
+                    <a:schemeClr val="accent6">
+                      <a:lumMod val="60000"/>
+                      <a:lumOff val="40000"/>
+                    </a:schemeClr>
+                  </a:solidFill>
+                  <a:ln w="50800" cmpd="sng">
+                    <a:solidFill>
+                      <a:schemeClr val="accent6">
+                        <a:lumMod val="75000"/>
+                      </a:schemeClr>
+                    </a:solidFill>
+                    <a:prstDash val="solid"/>
+                  </a:ln>
+                </p:spPr>
+                <p:style>
+                  <a:lnRef idx="2">
+                    <a:schemeClr val="accent1">
+                      <a:shade val="50000"/>
+                    </a:schemeClr>
+                  </a:lnRef>
+                  <a:fillRef idx="1">
+                    <a:schemeClr val="accent1"/>
+                  </a:fillRef>
+                  <a:effectRef idx="0">
+                    <a:schemeClr val="accent1"/>
+                  </a:effectRef>
+                  <a:fontRef idx="minor">
+                    <a:schemeClr val="lt1"/>
+                  </a:fontRef>
+                </p:style>
+                <p:txBody>
+                  <a:bodyPr rtlCol="0" anchor="ctr"/>
+                  <a:p>
+                    <a:pPr algn="ctr"/>
+                    <a:endParaRPr lang="en-US" altLang="en-US" i="1">
+                      <a:solidFill>
+                        <a:schemeClr val="accent1">
+                          <a:lumMod val="50000"/>
+                        </a:schemeClr>
+                      </a:solidFill>
+                      <a:sym typeface="+mn-ea"/>
+                    </a:endParaRPr>
+                  </a:p>
+                </p:txBody>
+              </p:sp>
+            </p:grpSp>
+            <p:grpSp>
+              <p:nvGrpSpPr>
+                <p:cNvPr id="24" name="Group 23"/>
+                <p:cNvGrpSpPr/>
+                <p:nvPr/>
+              </p:nvGrpSpPr>
+              <p:grpSpPr>
+                <a:xfrm>
+                  <a:off x="1261" y="5616"/>
+                  <a:ext cx="12727" cy="1740"/>
+                  <a:chOff x="1261" y="1467"/>
+                  <a:chExt cx="12727" cy="1740"/>
+                </a:xfrm>
+              </p:grpSpPr>
+              <p:sp>
+                <p:nvSpPr>
+                  <p:cNvPr id="25" name="Rounded Rectangle 24"/>
+                  <p:cNvSpPr/>
+                  <p:nvPr/>
+                </p:nvSpPr>
+                <p:spPr>
+                  <a:xfrm>
+                    <a:off x="1261" y="1467"/>
+                    <a:ext cx="2898" cy="1740"/>
+                  </a:xfrm>
+                  <a:prstGeom prst="roundRect">
+                    <a:avLst/>
+                  </a:prstGeom>
+                  <a:solidFill>
+                    <a:schemeClr val="accent6">
+                      <a:lumMod val="60000"/>
+                      <a:lumOff val="40000"/>
+                    </a:schemeClr>
+                  </a:solidFill>
+                  <a:ln w="50800" cmpd="sng">
+                    <a:solidFill>
+                      <a:schemeClr val="accent6">
+                        <a:lumMod val="75000"/>
+                      </a:schemeClr>
+                    </a:solidFill>
+                    <a:prstDash val="solid"/>
+                  </a:ln>
+                </p:spPr>
+                <p:style>
+                  <a:lnRef idx="2">
+                    <a:schemeClr val="accent1">
+                      <a:shade val="50000"/>
+                    </a:schemeClr>
+                  </a:lnRef>
+                  <a:fillRef idx="1">
+                    <a:schemeClr val="accent1"/>
+                  </a:fillRef>
+                  <a:effectRef idx="0">
+                    <a:schemeClr val="accent1"/>
+                  </a:effectRef>
+                  <a:fontRef idx="minor">
+                    <a:schemeClr val="lt1"/>
+                  </a:fontRef>
+                </p:style>
+                <p:txBody>
+                  <a:bodyPr rtlCol="0" anchor="ctr"/>
+                  <a:p>
+                    <a:pPr algn="ctr"/>
+                    <a:endParaRPr lang="en-US" altLang="en-US" i="1">
+                      <a:solidFill>
+                        <a:schemeClr val="accent1">
+                          <a:lumMod val="50000"/>
+                        </a:schemeClr>
+                      </a:solidFill>
+                      <a:sym typeface="+mn-ea"/>
+                    </a:endParaRPr>
+                  </a:p>
+                </p:txBody>
+              </p:sp>
+              <p:sp>
+                <p:nvSpPr>
+                  <p:cNvPr id="27" name="Rounded Rectangle 26"/>
+                  <p:cNvSpPr/>
+                  <p:nvPr/>
+                </p:nvSpPr>
+                <p:spPr>
+                  <a:xfrm>
+                    <a:off x="7800" y="1467"/>
+                    <a:ext cx="2898" cy="1740"/>
+                  </a:xfrm>
+                  <a:prstGeom prst="roundRect">
+                    <a:avLst/>
+                  </a:prstGeom>
+                  <a:solidFill>
+                    <a:schemeClr val="accent6">
+                      <a:lumMod val="60000"/>
+                      <a:lumOff val="40000"/>
+                    </a:schemeClr>
+                  </a:solidFill>
+                  <a:ln w="50800" cmpd="sng">
+                    <a:solidFill>
+                      <a:schemeClr val="accent6">
+                        <a:lumMod val="75000"/>
+                      </a:schemeClr>
+                    </a:solidFill>
+                    <a:prstDash val="solid"/>
+                  </a:ln>
+                </p:spPr>
+                <p:style>
+                  <a:lnRef idx="2">
+                    <a:schemeClr val="accent1">
+                      <a:shade val="50000"/>
+                    </a:schemeClr>
+                  </a:lnRef>
+                  <a:fillRef idx="1">
+                    <a:schemeClr val="accent1"/>
+                  </a:fillRef>
+                  <a:effectRef idx="0">
+                    <a:schemeClr val="accent1"/>
+                  </a:effectRef>
+                  <a:fontRef idx="minor">
+                    <a:schemeClr val="lt1"/>
+                  </a:fontRef>
+                </p:style>
+                <p:txBody>
+                  <a:bodyPr rtlCol="0" anchor="ctr"/>
+                  <a:p>
+                    <a:pPr algn="ctr"/>
+                    <a:endParaRPr lang="en-US" altLang="en-US" i="1">
+                      <a:solidFill>
+                        <a:schemeClr val="accent1">
+                          <a:lumMod val="50000"/>
+                        </a:schemeClr>
+                      </a:solidFill>
+                      <a:sym typeface="+mn-ea"/>
+                    </a:endParaRPr>
+                  </a:p>
+                </p:txBody>
+              </p:sp>
+              <p:sp>
+                <p:nvSpPr>
+                  <p:cNvPr id="28" name="Rounded Rectangle 27"/>
+                  <p:cNvSpPr/>
+                  <p:nvPr/>
+                </p:nvSpPr>
+                <p:spPr>
+                  <a:xfrm>
+                    <a:off x="11090" y="1467"/>
+                    <a:ext cx="2898" cy="1740"/>
+                  </a:xfrm>
+                  <a:prstGeom prst="roundRect">
+                    <a:avLst/>
+                  </a:prstGeom>
+                  <a:solidFill>
+                    <a:schemeClr val="accent6">
+                      <a:lumMod val="60000"/>
+                      <a:lumOff val="40000"/>
+                    </a:schemeClr>
+                  </a:solidFill>
+                  <a:ln w="50800" cmpd="sng">
+                    <a:solidFill>
+                      <a:schemeClr val="accent6">
+                        <a:lumMod val="75000"/>
+                      </a:schemeClr>
+                    </a:solidFill>
+                    <a:prstDash val="solid"/>
+                  </a:ln>
+                </p:spPr>
+                <p:style>
+                  <a:lnRef idx="2">
+                    <a:schemeClr val="accent1">
+                      <a:shade val="50000"/>
+                    </a:schemeClr>
+                  </a:lnRef>
+                  <a:fillRef idx="1">
+                    <a:schemeClr val="accent1"/>
+                  </a:fillRef>
+                  <a:effectRef idx="0">
+                    <a:schemeClr val="accent1"/>
+                  </a:effectRef>
+                  <a:fontRef idx="minor">
+                    <a:schemeClr val="lt1"/>
+                  </a:fontRef>
+                </p:style>
+                <p:txBody>
+                  <a:bodyPr rtlCol="0" anchor="ctr"/>
+                  <a:p>
+                    <a:pPr algn="ctr"/>
+                    <a:endParaRPr lang="en-US" altLang="en-US" i="1">
+                      <a:solidFill>
+                        <a:schemeClr val="accent1">
+                          <a:lumMod val="50000"/>
+                        </a:schemeClr>
+                      </a:solidFill>
+                      <a:sym typeface="+mn-ea"/>
+                    </a:endParaRPr>
+                  </a:p>
+                </p:txBody>
+              </p:sp>
+            </p:grpSp>
+            <p:grpSp>
+              <p:nvGrpSpPr>
+                <p:cNvPr id="30" name="Group 29"/>
+                <p:cNvGrpSpPr/>
+                <p:nvPr/>
+              </p:nvGrpSpPr>
+              <p:grpSpPr>
+                <a:xfrm>
+                  <a:off x="4530" y="7691"/>
+                  <a:ext cx="9458" cy="1740"/>
+                  <a:chOff x="4530" y="1467"/>
+                  <a:chExt cx="9458" cy="1740"/>
+                </a:xfrm>
+              </p:grpSpPr>
+              <p:sp>
+                <p:nvSpPr>
+                  <p:cNvPr id="32" name="Rounded Rectangle 31"/>
+                  <p:cNvSpPr/>
+                  <p:nvPr/>
+                </p:nvSpPr>
+                <p:spPr>
+                  <a:xfrm>
+                    <a:off x="4530" y="1467"/>
+                    <a:ext cx="2898" cy="1740"/>
+                  </a:xfrm>
+                  <a:prstGeom prst="roundRect">
+                    <a:avLst/>
+                  </a:prstGeom>
+                  <a:solidFill>
+                    <a:schemeClr val="accent6">
+                      <a:lumMod val="60000"/>
+                      <a:lumOff val="40000"/>
+                    </a:schemeClr>
+                  </a:solidFill>
+                  <a:ln w="50800" cmpd="sng">
+                    <a:solidFill>
+                      <a:schemeClr val="accent6">
+                        <a:lumMod val="75000"/>
+                      </a:schemeClr>
+                    </a:solidFill>
+                    <a:prstDash val="solid"/>
+                  </a:ln>
+                </p:spPr>
+                <p:style>
+                  <a:lnRef idx="2">
+                    <a:schemeClr val="accent1">
+                      <a:shade val="50000"/>
+                    </a:schemeClr>
+                  </a:lnRef>
+                  <a:fillRef idx="1">
+                    <a:schemeClr val="accent1"/>
+                  </a:fillRef>
+                  <a:effectRef idx="0">
+                    <a:schemeClr val="accent1"/>
+                  </a:effectRef>
+                  <a:fontRef idx="minor">
+                    <a:schemeClr val="lt1"/>
+                  </a:fontRef>
+                </p:style>
+                <p:txBody>
+                  <a:bodyPr rtlCol="0" anchor="ctr"/>
+                  <a:p>
+                    <a:pPr algn="ctr"/>
+                    <a:endParaRPr lang="en-US" altLang="en-US" i="1">
+                      <a:solidFill>
+                        <a:schemeClr val="accent1">
+                          <a:lumMod val="50000"/>
+                        </a:schemeClr>
+                      </a:solidFill>
+                      <a:sym typeface="+mn-ea"/>
+                    </a:endParaRPr>
+                  </a:p>
+                </p:txBody>
+              </p:sp>
+              <p:sp>
+                <p:nvSpPr>
+                  <p:cNvPr id="33" name="Rounded Rectangle 32"/>
+                  <p:cNvSpPr/>
+                  <p:nvPr/>
+                </p:nvSpPr>
+                <p:spPr>
+                  <a:xfrm>
+                    <a:off x="7800" y="1467"/>
+                    <a:ext cx="2898" cy="1740"/>
+                  </a:xfrm>
+                  <a:prstGeom prst="roundRect">
+                    <a:avLst/>
+                  </a:prstGeom>
+                  <a:solidFill>
+                    <a:schemeClr val="accent6">
+                      <a:lumMod val="60000"/>
+                      <a:lumOff val="40000"/>
+                    </a:schemeClr>
+                  </a:solidFill>
+                  <a:ln w="50800" cmpd="sng">
+                    <a:solidFill>
+                      <a:schemeClr val="accent6">
+                        <a:lumMod val="75000"/>
+                      </a:schemeClr>
+                    </a:solidFill>
+                    <a:prstDash val="solid"/>
+                  </a:ln>
+                </p:spPr>
+                <p:style>
+                  <a:lnRef idx="2">
+                    <a:schemeClr val="accent1">
+                      <a:shade val="50000"/>
+                    </a:schemeClr>
+                  </a:lnRef>
+                  <a:fillRef idx="1">
+                    <a:schemeClr val="accent1"/>
+                  </a:fillRef>
+                  <a:effectRef idx="0">
+                    <a:schemeClr val="accent1"/>
+                  </a:effectRef>
+                  <a:fontRef idx="minor">
+                    <a:schemeClr val="lt1"/>
+                  </a:fontRef>
+                </p:style>
+                <p:txBody>
+                  <a:bodyPr rtlCol="0" anchor="ctr"/>
+                  <a:p>
+                    <a:pPr algn="ctr"/>
+                    <a:endParaRPr lang="en-US" altLang="en-US" i="1">
+                      <a:solidFill>
+                        <a:schemeClr val="accent1">
+                          <a:lumMod val="50000"/>
+                        </a:schemeClr>
+                      </a:solidFill>
+                      <a:sym typeface="+mn-ea"/>
+                    </a:endParaRPr>
+                  </a:p>
+                </p:txBody>
+              </p:sp>
+              <p:sp>
+                <p:nvSpPr>
+                  <p:cNvPr id="34" name="Rounded Rectangle 33"/>
+                  <p:cNvSpPr/>
+                  <p:nvPr/>
+                </p:nvSpPr>
+                <p:spPr>
+                  <a:xfrm>
+                    <a:off x="11090" y="1467"/>
+                    <a:ext cx="2898" cy="1740"/>
+                  </a:xfrm>
+                  <a:prstGeom prst="roundRect">
+                    <a:avLst/>
+                  </a:prstGeom>
+                  <a:solidFill>
+                    <a:schemeClr val="accent6">
+                      <a:lumMod val="60000"/>
+                      <a:lumOff val="40000"/>
+                    </a:schemeClr>
+                  </a:solidFill>
+                  <a:ln w="50800" cmpd="sng">
+                    <a:solidFill>
+                      <a:schemeClr val="accent6">
+                        <a:lumMod val="75000"/>
+                      </a:schemeClr>
+                    </a:solidFill>
+                    <a:prstDash val="solid"/>
+                  </a:ln>
+                </p:spPr>
+                <p:style>
+                  <a:lnRef idx="2">
+                    <a:schemeClr val="accent1">
+                      <a:shade val="50000"/>
+                    </a:schemeClr>
+                  </a:lnRef>
+                  <a:fillRef idx="1">
+                    <a:schemeClr val="accent1"/>
+                  </a:fillRef>
+                  <a:effectRef idx="0">
+                    <a:schemeClr val="accent1"/>
+                  </a:effectRef>
+                  <a:fontRef idx="minor">
+                    <a:schemeClr val="lt1"/>
+                  </a:fontRef>
+                </p:style>
+                <p:txBody>
+                  <a:bodyPr rtlCol="0" anchor="ctr"/>
+                  <a:p>
+                    <a:pPr algn="ctr"/>
+                    <a:endParaRPr lang="en-US" altLang="en-US" i="1">
+                      <a:solidFill>
+                        <a:schemeClr val="accent1">
+                          <a:lumMod val="50000"/>
+                        </a:schemeClr>
+                      </a:solidFill>
+                      <a:sym typeface="+mn-ea"/>
+                    </a:endParaRPr>
+                  </a:p>
+                </p:txBody>
+              </p:sp>
+            </p:grpSp>
+            <p:sp>
+              <p:nvSpPr>
+                <p:cNvPr id="36" name="Rounded Rectangle 35"/>
+                <p:cNvSpPr/>
+                <p:nvPr/>
+              </p:nvSpPr>
+              <p:spPr>
+                <a:xfrm>
+                  <a:off x="7800" y="3541"/>
+                  <a:ext cx="2898" cy="1740"/>
+                </a:xfrm>
+                <a:prstGeom prst="roundRect">
+                  <a:avLst/>
+                </a:prstGeom>
+                <a:solidFill>
+                  <a:schemeClr val="accent2">
+                    <a:lumMod val="60000"/>
+                    <a:lumOff val="40000"/>
+                  </a:schemeClr>
+                </a:solidFill>
+                <a:ln w="50800" cmpd="sng">
+                  <a:solidFill>
+                    <a:schemeClr val="accent2">
+                      <a:lumMod val="75000"/>
+                    </a:schemeClr>
+                  </a:solidFill>
+                  <a:prstDash val="solid"/>
+                </a:ln>
+              </p:spPr>
+              <p:style>
+                <a:lnRef idx="2">
+                  <a:schemeClr val="accent1">
+                    <a:shade val="50000"/>
+                  </a:schemeClr>
+                </a:lnRef>
+                <a:fillRef idx="1">
+                  <a:schemeClr val="accent1"/>
+                </a:fillRef>
+                <a:effectRef idx="0">
+                  <a:schemeClr val="accent1"/>
+                </a:effectRef>
+                <a:fontRef idx="minor">
+                  <a:schemeClr val="lt1"/>
+                </a:fontRef>
+              </p:style>
+              <p:txBody>
+                <a:bodyPr rtlCol="0" anchor="ctr"/>
+                <a:p>
+                  <a:pPr algn="ctr"/>
+                  <a:endParaRPr lang="en-US" altLang="en-US" i="1">
+                    <a:solidFill>
+                      <a:schemeClr val="accent1">
+                        <a:lumMod val="50000"/>
+                      </a:schemeClr>
+                    </a:solidFill>
+                    <a:sym typeface="+mn-ea"/>
+                  </a:endParaRPr>
+                </a:p>
+              </p:txBody>
+            </p:sp>
+            <p:sp>
+              <p:nvSpPr>
+                <p:cNvPr id="37" name="Rounded Rectangle 36"/>
+                <p:cNvSpPr/>
+                <p:nvPr/>
+              </p:nvSpPr>
+              <p:spPr>
+                <a:xfrm>
+                  <a:off x="4530" y="5616"/>
+                  <a:ext cx="2898" cy="1740"/>
+                </a:xfrm>
+                <a:prstGeom prst="roundRect">
+                  <a:avLst/>
+                </a:prstGeom>
+                <a:solidFill>
+                  <a:schemeClr val="accent2">
+                    <a:lumMod val="60000"/>
+                    <a:lumOff val="40000"/>
+                  </a:schemeClr>
+                </a:solidFill>
+                <a:ln w="50800" cmpd="sng">
+                  <a:solidFill>
+                    <a:schemeClr val="accent2">
+                      <a:lumMod val="75000"/>
+                    </a:schemeClr>
+                  </a:solidFill>
+                  <a:prstDash val="solid"/>
+                </a:ln>
+              </p:spPr>
+              <p:style>
+                <a:lnRef idx="2">
+                  <a:schemeClr val="accent1">
+                    <a:shade val="50000"/>
+                  </a:schemeClr>
+                </a:lnRef>
+                <a:fillRef idx="1">
+                  <a:schemeClr val="accent1"/>
+                </a:fillRef>
+                <a:effectRef idx="0">
+                  <a:schemeClr val="accent1"/>
+                </a:effectRef>
+                <a:fontRef idx="minor">
+                  <a:schemeClr val="lt1"/>
+                </a:fontRef>
+              </p:style>
+              <p:txBody>
+                <a:bodyPr rtlCol="0" anchor="ctr"/>
+                <a:p>
+                  <a:pPr algn="ctr"/>
+                  <a:endParaRPr lang="en-US" altLang="en-US" i="1">
+                    <a:solidFill>
+                      <a:schemeClr val="accent1">
+                        <a:lumMod val="50000"/>
+                      </a:schemeClr>
+                    </a:solidFill>
+                    <a:sym typeface="+mn-ea"/>
+                  </a:endParaRPr>
+                </a:p>
+              </p:txBody>
+            </p:sp>
+            <p:sp>
+              <p:nvSpPr>
+                <p:cNvPr id="38" name="Rounded Rectangle 37"/>
+                <p:cNvSpPr/>
+                <p:nvPr/>
+              </p:nvSpPr>
+              <p:spPr>
+                <a:xfrm>
+                  <a:off x="1261" y="7691"/>
+                  <a:ext cx="2898" cy="1740"/>
+                </a:xfrm>
+                <a:prstGeom prst="roundRect">
+                  <a:avLst/>
+                </a:prstGeom>
+                <a:solidFill>
+                  <a:schemeClr val="accent2">
+                    <a:lumMod val="60000"/>
+                    <a:lumOff val="40000"/>
+                  </a:schemeClr>
+                </a:solidFill>
+                <a:ln w="50800" cmpd="sng">
+                  <a:solidFill>
+                    <a:schemeClr val="accent2">
+                      <a:lumMod val="75000"/>
+                    </a:schemeClr>
+                  </a:solidFill>
+                  <a:prstDash val="solid"/>
+                </a:ln>
+              </p:spPr>
+              <p:style>
+                <a:lnRef idx="2">
+                  <a:schemeClr val="accent1">
+                    <a:shade val="50000"/>
+                  </a:schemeClr>
+                </a:lnRef>
+                <a:fillRef idx="1">
+                  <a:schemeClr val="accent1"/>
+                </a:fillRef>
+                <a:effectRef idx="0">
+                  <a:schemeClr val="accent1"/>
+                </a:effectRef>
+                <a:fontRef idx="minor">
+                  <a:schemeClr val="lt1"/>
+                </a:fontRef>
+              </p:style>
+              <p:txBody>
+                <a:bodyPr rtlCol="0" anchor="ctr"/>
+                <a:p>
+                  <a:pPr algn="ctr"/>
+                  <a:endParaRPr lang="en-US" altLang="en-US" i="1">
+                    <a:solidFill>
+                      <a:schemeClr val="accent1">
+                        <a:lumMod val="50000"/>
+                      </a:schemeClr>
+                    </a:solidFill>
+                    <a:sym typeface="+mn-ea"/>
+                  </a:endParaRPr>
+                </a:p>
+              </p:txBody>
+            </p:sp>
+          </p:grpSp>
+          <p:sp>
+            <p:nvSpPr>
+              <p:cNvPr id="40" name="Rounded Rectangle 39"/>
+              <p:cNvSpPr/>
+              <p:nvPr/>
+            </p:nvSpPr>
+            <p:spPr>
+              <a:xfrm>
+                <a:off x="3938" y="946"/>
+                <a:ext cx="793" cy="467"/>
+              </a:xfrm>
+              <a:prstGeom prst="roundRect">
+                <a:avLst/>
+              </a:prstGeom>
+              <a:solidFill>
+                <a:schemeClr val="accent6">
+                  <a:lumMod val="60000"/>
+                  <a:lumOff val="40000"/>
+                </a:schemeClr>
+              </a:solidFill>
+              <a:ln w="50800" cmpd="sng">
+                <a:solidFill>
+                  <a:schemeClr val="accent6">
+                    <a:lumMod val="75000"/>
+                  </a:schemeClr>
+                </a:solidFill>
+                <a:prstDash val="solid"/>
+              </a:ln>
+            </p:spPr>
+            <p:style>
+              <a:lnRef idx="2">
+                <a:schemeClr val="accent1">
+                  <a:shade val="50000"/>
+                </a:schemeClr>
+              </a:lnRef>
+              <a:fillRef idx="1">
+                <a:schemeClr val="accent1"/>
+              </a:fillRef>
+              <a:effectRef idx="0">
+                <a:schemeClr val="accent1"/>
+              </a:effectRef>
+              <a:fontRef idx="minor">
+                <a:schemeClr val="lt1"/>
+              </a:fontRef>
+            </p:style>
+            <p:txBody>
+              <a:bodyPr rtlCol="0" anchor="ctr"/>
+              <a:p>
+                <a:pPr algn="ctr"/>
+                <a:endParaRPr lang="en-US" altLang="en-US" i="1">
+                  <a:solidFill>
+                    <a:schemeClr val="accent1">
+                      <a:lumMod val="50000"/>
+                    </a:schemeClr>
+                  </a:solidFill>
+                  <a:sym typeface="+mn-ea"/>
+                </a:endParaRPr>
+              </a:p>
+            </p:txBody>
+          </p:sp>
+          <p:sp>
+            <p:nvSpPr>
+              <p:cNvPr id="41" name="Rounded Rectangle 40"/>
+              <p:cNvSpPr/>
+              <p:nvPr/>
+            </p:nvSpPr>
+            <p:spPr>
+              <a:xfrm>
+                <a:off x="3938" y="1688"/>
+                <a:ext cx="793" cy="467"/>
+              </a:xfrm>
+              <a:prstGeom prst="roundRect">
+                <a:avLst/>
+              </a:prstGeom>
+              <a:solidFill>
+                <a:schemeClr val="accent2">
+                  <a:lumMod val="60000"/>
+                  <a:lumOff val="40000"/>
+                </a:schemeClr>
+              </a:solidFill>
+              <a:ln w="50800" cmpd="sng">
+                <a:solidFill>
+                  <a:schemeClr val="accent2">
+                    <a:lumMod val="75000"/>
+                  </a:schemeClr>
+                </a:solidFill>
+                <a:prstDash val="solid"/>
+              </a:ln>
+            </p:spPr>
+            <p:style>
+              <a:lnRef idx="2">
+                <a:schemeClr val="accent1">
+                  <a:shade val="50000"/>
+                </a:schemeClr>
+              </a:lnRef>
+              <a:fillRef idx="1">
+                <a:schemeClr val="accent1"/>
+              </a:fillRef>
+              <a:effectRef idx="0">
+                <a:schemeClr val="accent1"/>
+              </a:effectRef>
+              <a:fontRef idx="minor">
+                <a:schemeClr val="lt1"/>
+              </a:fontRef>
+            </p:style>
+            <p:txBody>
+              <a:bodyPr rtlCol="0" anchor="ctr"/>
+              <a:p>
+                <a:pPr algn="ctr"/>
+                <a:endParaRPr lang="en-US" altLang="en-US" i="1">
+                  <a:solidFill>
+                    <a:schemeClr val="accent1">
+                      <a:lumMod val="50000"/>
+                    </a:schemeClr>
+                  </a:solidFill>
+                  <a:sym typeface="+mn-ea"/>
+                </a:endParaRPr>
+              </a:p>
+            </p:txBody>
+          </p:sp>
+          <p:sp>
+            <p:nvSpPr>
+              <p:cNvPr id="42" name="Text Box 41"/>
+              <p:cNvSpPr txBox="1"/>
+              <p:nvPr/>
+            </p:nvSpPr>
+            <p:spPr>
+              <a:xfrm>
+                <a:off x="5149" y="938"/>
+                <a:ext cx="3594" cy="649"/>
+              </a:xfrm>
+              <a:prstGeom prst="rect">
+                <a:avLst/>
+              </a:prstGeom>
+              <a:noFill/>
+            </p:spPr>
+            <p:txBody>
+              <a:bodyPr wrap="square" rtlCol="0">
+                <a:spAutoFit/>
+              </a:bodyPr>
+              <a:p>
+                <a:r>
+                  <a:rPr lang="en-US" altLang="en-US" b="1">
+                    <a:solidFill>
+                      <a:schemeClr val="accent6">
+                        <a:lumMod val="75000"/>
+                      </a:schemeClr>
+                    </a:solidFill>
+                  </a:rPr>
+                  <a:t>TRAINING FOLDS</a:t>
+                </a:r>
+                <a:endParaRPr lang="en-US" altLang="en-US" b="1">
+                  <a:solidFill>
+                    <a:schemeClr val="accent6">
+                      <a:lumMod val="75000"/>
+                    </a:schemeClr>
+                  </a:solidFill>
+                </a:endParaRPr>
+              </a:p>
+            </p:txBody>
+          </p:sp>
+          <p:sp>
+            <p:nvSpPr>
+              <p:cNvPr id="43" name="Text Box 42"/>
+              <p:cNvSpPr txBox="1"/>
+              <p:nvPr/>
+            </p:nvSpPr>
+            <p:spPr>
+              <a:xfrm>
+                <a:off x="5149" y="1671"/>
+                <a:ext cx="3594" cy="649"/>
+              </a:xfrm>
+              <a:prstGeom prst="rect">
+                <a:avLst/>
+              </a:prstGeom>
+              <a:noFill/>
+            </p:spPr>
+            <p:txBody>
+              <a:bodyPr wrap="square" rtlCol="0">
+                <a:spAutoFit/>
+              </a:bodyPr>
+              <a:p>
+                <a:r>
+                  <a:rPr lang="en-US" altLang="en-US" b="1">
+                    <a:solidFill>
+                      <a:schemeClr val="accent2">
+                        <a:lumMod val="75000"/>
+                      </a:schemeClr>
+                    </a:solidFill>
+                  </a:rPr>
+                  <a:t>VALIDATION FOLD</a:t>
+                </a:r>
+                <a:endParaRPr lang="en-US" altLang="en-US" b="1">
+                  <a:solidFill>
+                    <a:schemeClr val="accent2">
+                      <a:lumMod val="75000"/>
+                    </a:schemeClr>
+                  </a:solidFill>
+                </a:endParaRPr>
+              </a:p>
+            </p:txBody>
+          </p:sp>
+        </p:grpSp>
+        <p:sp>
+          <p:nvSpPr>
+            <p:cNvPr id="45" name="Text Box 44"/>
+            <p:cNvSpPr txBox="1"/>
+            <p:nvPr/>
+          </p:nvSpPr>
+          <p:spPr>
+            <a:xfrm>
+              <a:off x="11585" y="3900"/>
+              <a:ext cx="2791" cy="1298"/>
+            </a:xfrm>
+            <a:prstGeom prst="rect">
+              <a:avLst/>
+            </a:prstGeom>
+            <a:noFill/>
+          </p:spPr>
+          <p:txBody>
+            <a:bodyPr wrap="square" rtlCol="0">
+              <a:spAutoFit/>
+            </a:bodyPr>
+            <a:p>
+              <a:r>
+                <a:rPr lang="en-US" altLang="en-US" sz="1400" b="1" i="1">
+                  <a:solidFill>
+                    <a:schemeClr val="bg2">
+                      <a:lumMod val="50000"/>
+                    </a:schemeClr>
+                  </a:solidFill>
+                  <a:sym typeface="+mn-ea"/>
+                </a:rPr>
+                <a:t>Model A |</a:t>
+              </a:r>
+              <a:r>
+                <a:rPr lang="en-US" altLang="en-US" sz="1400" b="1" i="1">
+                  <a:solidFill>
+                    <a:schemeClr val="accent2">
+                      <a:lumMod val="75000"/>
+                    </a:schemeClr>
+                  </a:solidFill>
+                  <a:sym typeface="+mn-ea"/>
+                </a:rPr>
+                <a:t> perf A.1</a:t>
+              </a:r>
+              <a:endParaRPr lang="en-US" altLang="en-US" sz="1400" b="1" i="1">
+                <a:solidFill>
+                  <a:schemeClr val="accent2">
+                    <a:lumMod val="75000"/>
+                  </a:schemeClr>
+                </a:solidFill>
+                <a:sym typeface="+mn-ea"/>
+              </a:endParaRPr>
+            </a:p>
+            <a:p>
+              <a:r>
+                <a:rPr lang="en-US" altLang="en-US" sz="1400" b="1" i="1">
+                  <a:solidFill>
+                    <a:schemeClr val="bg2">
+                      <a:lumMod val="50000"/>
+                    </a:schemeClr>
+                  </a:solidFill>
+                  <a:sym typeface="+mn-ea"/>
+                </a:rPr>
+                <a:t>Model B |</a:t>
+              </a:r>
+              <a:r>
+                <a:rPr lang="en-US" altLang="en-US" sz="1400" b="1" i="1">
+                  <a:solidFill>
+                    <a:schemeClr val="accent2">
+                      <a:lumMod val="75000"/>
+                    </a:schemeClr>
+                  </a:solidFill>
+                  <a:sym typeface="+mn-ea"/>
+                </a:rPr>
+                <a:t> perf B.1</a:t>
+              </a:r>
+              <a:endParaRPr lang="en-US" altLang="en-US" sz="1400" b="1" i="1">
+                <a:solidFill>
+                  <a:schemeClr val="accent2">
+                    <a:lumMod val="75000"/>
+                  </a:schemeClr>
+                </a:solidFill>
+                <a:sym typeface="+mn-ea"/>
+              </a:endParaRPr>
+            </a:p>
+            <a:p>
+              <a:r>
+                <a:rPr lang="en-US" altLang="en-US" sz="1400" b="1" i="1">
+                  <a:solidFill>
+                    <a:schemeClr val="bg2">
+                      <a:lumMod val="50000"/>
+                    </a:schemeClr>
+                  </a:solidFill>
+                  <a:sym typeface="+mn-ea"/>
+                </a:rPr>
+                <a:t>Model C |</a:t>
+              </a:r>
+              <a:r>
+                <a:rPr lang="en-US" altLang="en-US" sz="1400" b="1" i="1">
+                  <a:solidFill>
+                    <a:schemeClr val="accent2">
+                      <a:lumMod val="75000"/>
+                    </a:schemeClr>
+                  </a:solidFill>
+                  <a:sym typeface="+mn-ea"/>
+                </a:rPr>
+                <a:t> perf C.1</a:t>
+              </a:r>
+              <a:r>
+                <a:rPr lang="en-US" altLang="en-US" sz="1400" b="1" i="1">
+                  <a:solidFill>
+                    <a:schemeClr val="accent2">
+                      <a:lumMod val="75000"/>
+                    </a:schemeClr>
+                  </a:solidFill>
+                </a:rPr>
+                <a:t>...</a:t>
+              </a:r>
+              <a:endParaRPr lang="en-US" altLang="en-US" sz="1400" b="1" i="1">
+                <a:solidFill>
+                  <a:schemeClr val="accent2">
+                    <a:lumMod val="75000"/>
+                  </a:schemeClr>
+                </a:solidFill>
+              </a:endParaRPr>
+            </a:p>
+          </p:txBody>
+        </p:sp>
+        <p:sp>
+          <p:nvSpPr>
+            <p:cNvPr id="46" name="Text Box 45"/>
+            <p:cNvSpPr txBox="1"/>
+            <p:nvPr/>
+          </p:nvSpPr>
+          <p:spPr>
+            <a:xfrm>
+              <a:off x="11646" y="5240"/>
+              <a:ext cx="2791" cy="1732"/>
+            </a:xfrm>
+            <a:prstGeom prst="rect">
+              <a:avLst/>
+            </a:prstGeom>
+            <a:noFill/>
+          </p:spPr>
+          <p:txBody>
+            <a:bodyPr wrap="square" rtlCol="0">
+              <a:spAutoFit/>
+            </a:bodyPr>
+            <a:p>
+              <a:r>
+                <a:rPr lang="en-US" altLang="en-US" sz="1400" b="1" i="1">
+                  <a:solidFill>
+                    <a:schemeClr val="bg2">
+                      <a:lumMod val="50000"/>
+                    </a:schemeClr>
+                  </a:solidFill>
+                  <a:sym typeface="+mn-ea"/>
+                </a:rPr>
+                <a:t>Model A |</a:t>
+              </a:r>
+              <a:r>
+                <a:rPr lang="en-US" altLang="en-US" sz="1400" b="1" i="1">
+                  <a:solidFill>
+                    <a:schemeClr val="accent2">
+                      <a:lumMod val="75000"/>
+                    </a:schemeClr>
+                  </a:solidFill>
+                  <a:sym typeface="+mn-ea"/>
+                </a:rPr>
+                <a:t> perf A.2</a:t>
+              </a:r>
+              <a:endParaRPr lang="en-US" altLang="en-US" sz="1400" b="1" i="1">
+                <a:solidFill>
+                  <a:schemeClr val="accent2">
+                    <a:lumMod val="75000"/>
+                  </a:schemeClr>
+                </a:solidFill>
+                <a:sym typeface="+mn-ea"/>
+              </a:endParaRPr>
+            </a:p>
+            <a:p>
+              <a:r>
+                <a:rPr lang="en-US" altLang="en-US" sz="1400" b="1" i="1">
+                  <a:solidFill>
+                    <a:schemeClr val="bg2">
+                      <a:lumMod val="50000"/>
+                    </a:schemeClr>
+                  </a:solidFill>
+                  <a:sym typeface="+mn-ea"/>
+                </a:rPr>
+                <a:t>Model B |</a:t>
+              </a:r>
+              <a:r>
+                <a:rPr lang="en-US" altLang="en-US" sz="1400" b="1" i="1">
+                  <a:solidFill>
+                    <a:schemeClr val="accent2">
+                      <a:lumMod val="75000"/>
+                    </a:schemeClr>
+                  </a:solidFill>
+                  <a:sym typeface="+mn-ea"/>
+                </a:rPr>
+                <a:t> perf B.2</a:t>
+              </a:r>
+              <a:endParaRPr lang="en-US" altLang="en-US" sz="1400" b="1" i="1">
+                <a:solidFill>
+                  <a:schemeClr val="accent2">
+                    <a:lumMod val="75000"/>
+                  </a:schemeClr>
+                </a:solidFill>
+                <a:sym typeface="+mn-ea"/>
+              </a:endParaRPr>
+            </a:p>
+            <a:p>
+              <a:r>
+                <a:rPr lang="en-US" altLang="en-US" sz="1400" b="1" i="1">
+                  <a:solidFill>
+                    <a:schemeClr val="bg2">
+                      <a:lumMod val="50000"/>
+                    </a:schemeClr>
+                  </a:solidFill>
+                  <a:sym typeface="+mn-ea"/>
+                </a:rPr>
+                <a:t>Model C |</a:t>
+              </a:r>
+              <a:r>
+                <a:rPr lang="en-US" altLang="en-US" sz="1400" b="1" i="1">
+                  <a:solidFill>
+                    <a:schemeClr val="accent2">
+                      <a:lumMod val="75000"/>
+                    </a:schemeClr>
+                  </a:solidFill>
+                  <a:sym typeface="+mn-ea"/>
+                </a:rPr>
+                <a:t> perf C.2</a:t>
+              </a:r>
+              <a:endParaRPr lang="en-US" altLang="en-US" sz="1400" b="1" i="1">
+                <a:solidFill>
+                  <a:schemeClr val="accent2">
+                    <a:lumMod val="75000"/>
+                  </a:schemeClr>
+                </a:solidFill>
+                <a:sym typeface="+mn-ea"/>
+              </a:endParaRPr>
+            </a:p>
+            <a:p>
+              <a:endParaRPr lang="en-US" altLang="en-US" sz="1600" b="1" i="1">
+                <a:solidFill>
+                  <a:schemeClr val="accent2">
+                    <a:lumMod val="75000"/>
+                  </a:schemeClr>
+                </a:solidFill>
+              </a:endParaRPr>
+            </a:p>
+          </p:txBody>
+        </p:sp>
+        <p:sp>
+          <p:nvSpPr>
+            <p:cNvPr id="47" name="Text Box 46"/>
+            <p:cNvSpPr txBox="1"/>
+            <p:nvPr/>
+          </p:nvSpPr>
+          <p:spPr>
+            <a:xfrm>
+              <a:off x="11646" y="6708"/>
+              <a:ext cx="2791" cy="1298"/>
+            </a:xfrm>
+            <a:prstGeom prst="rect">
+              <a:avLst/>
+            </a:prstGeom>
+            <a:noFill/>
+          </p:spPr>
+          <p:txBody>
+            <a:bodyPr wrap="square" rtlCol="0">
+              <a:spAutoFit/>
+            </a:bodyPr>
+            <a:p>
+              <a:r>
+                <a:rPr lang="en-US" altLang="en-US" sz="1400" b="1" i="1">
+                  <a:solidFill>
+                    <a:schemeClr val="bg2">
+                      <a:lumMod val="50000"/>
+                    </a:schemeClr>
+                  </a:solidFill>
+                  <a:sym typeface="+mn-ea"/>
+                </a:rPr>
+                <a:t>Model A |</a:t>
+              </a:r>
+              <a:r>
+                <a:rPr lang="en-US" altLang="en-US" sz="1400" b="1" i="1">
+                  <a:solidFill>
+                    <a:schemeClr val="accent2">
+                      <a:lumMod val="75000"/>
+                    </a:schemeClr>
+                  </a:solidFill>
+                  <a:sym typeface="+mn-ea"/>
+                </a:rPr>
+                <a:t> perf A.3</a:t>
+              </a:r>
+              <a:endParaRPr lang="en-US" altLang="en-US" sz="1400" b="1" i="1">
+                <a:solidFill>
+                  <a:schemeClr val="accent2">
+                    <a:lumMod val="75000"/>
+                  </a:schemeClr>
+                </a:solidFill>
+                <a:sym typeface="+mn-ea"/>
+              </a:endParaRPr>
+            </a:p>
+            <a:p>
+              <a:r>
+                <a:rPr lang="en-US" altLang="en-US" sz="1400" b="1" i="1">
+                  <a:solidFill>
+                    <a:schemeClr val="bg2">
+                      <a:lumMod val="50000"/>
+                    </a:schemeClr>
+                  </a:solidFill>
+                  <a:sym typeface="+mn-ea"/>
+                </a:rPr>
+                <a:t>Model B |</a:t>
+              </a:r>
+              <a:r>
+                <a:rPr lang="en-US" altLang="en-US" sz="1400" b="1" i="1">
+                  <a:solidFill>
+                    <a:schemeClr val="accent2">
+                      <a:lumMod val="75000"/>
+                    </a:schemeClr>
+                  </a:solidFill>
+                  <a:sym typeface="+mn-ea"/>
+                </a:rPr>
+                <a:t> perf B.3</a:t>
+              </a:r>
+              <a:endParaRPr lang="en-US" altLang="en-US" sz="1400" b="1" i="1">
+                <a:solidFill>
+                  <a:schemeClr val="accent2">
+                    <a:lumMod val="75000"/>
+                  </a:schemeClr>
+                </a:solidFill>
+                <a:sym typeface="+mn-ea"/>
+              </a:endParaRPr>
+            </a:p>
+            <a:p>
+              <a:r>
+                <a:rPr lang="en-US" altLang="en-US" sz="1400" b="1" i="1">
+                  <a:solidFill>
+                    <a:schemeClr val="bg2">
+                      <a:lumMod val="50000"/>
+                    </a:schemeClr>
+                  </a:solidFill>
+                  <a:sym typeface="+mn-ea"/>
+                </a:rPr>
+                <a:t>Model C |</a:t>
+              </a:r>
+              <a:r>
+                <a:rPr lang="en-US" altLang="en-US" sz="1400" b="1" i="1">
+                  <a:solidFill>
+                    <a:schemeClr val="accent2">
+                      <a:lumMod val="75000"/>
+                    </a:schemeClr>
+                  </a:solidFill>
+                  <a:sym typeface="+mn-ea"/>
+                </a:rPr>
+                <a:t> perf C.3</a:t>
+              </a:r>
+              <a:endParaRPr lang="en-US" altLang="en-US" sz="1400" b="1" i="1">
+                <a:solidFill>
+                  <a:schemeClr val="accent2">
+                    <a:lumMod val="75000"/>
+                  </a:schemeClr>
+                </a:solidFill>
+                <a:sym typeface="+mn-ea"/>
+              </a:endParaRPr>
+            </a:p>
+          </p:txBody>
+        </p:sp>
+        <p:sp>
+          <p:nvSpPr>
+            <p:cNvPr id="48" name="Text Box 47"/>
+            <p:cNvSpPr txBox="1"/>
+            <p:nvPr/>
+          </p:nvSpPr>
+          <p:spPr>
+            <a:xfrm>
+              <a:off x="11646" y="8224"/>
+              <a:ext cx="2791" cy="1298"/>
+            </a:xfrm>
+            <a:prstGeom prst="rect">
+              <a:avLst/>
+            </a:prstGeom>
+            <a:noFill/>
+          </p:spPr>
+          <p:txBody>
+            <a:bodyPr wrap="square" rtlCol="0">
+              <a:spAutoFit/>
+            </a:bodyPr>
+            <a:p>
+              <a:r>
+                <a:rPr lang="en-US" altLang="en-US" sz="1400" b="1" i="1">
+                  <a:solidFill>
+                    <a:schemeClr val="bg2">
+                      <a:lumMod val="50000"/>
+                    </a:schemeClr>
+                  </a:solidFill>
+                  <a:sym typeface="+mn-ea"/>
+                </a:rPr>
+                <a:t>Model A |</a:t>
+              </a:r>
+              <a:r>
+                <a:rPr lang="en-US" altLang="en-US" sz="1400" b="1" i="1">
+                  <a:solidFill>
+                    <a:schemeClr val="accent2">
+                      <a:lumMod val="75000"/>
+                    </a:schemeClr>
+                  </a:solidFill>
+                  <a:sym typeface="+mn-ea"/>
+                </a:rPr>
+                <a:t> perf A.4</a:t>
+              </a:r>
+              <a:endParaRPr lang="en-US" altLang="en-US" sz="1400" b="1" i="1">
+                <a:solidFill>
+                  <a:schemeClr val="accent2">
+                    <a:lumMod val="75000"/>
+                  </a:schemeClr>
+                </a:solidFill>
+                <a:sym typeface="+mn-ea"/>
+              </a:endParaRPr>
+            </a:p>
+            <a:p>
+              <a:r>
+                <a:rPr lang="en-US" altLang="en-US" sz="1400" b="1" i="1">
+                  <a:solidFill>
+                    <a:schemeClr val="bg2">
+                      <a:lumMod val="50000"/>
+                    </a:schemeClr>
+                  </a:solidFill>
+                  <a:sym typeface="+mn-ea"/>
+                </a:rPr>
+                <a:t>Model B |</a:t>
+              </a:r>
+              <a:r>
+                <a:rPr lang="en-US" altLang="en-US" sz="1400" b="1" i="1">
+                  <a:solidFill>
+                    <a:schemeClr val="accent2">
+                      <a:lumMod val="75000"/>
+                    </a:schemeClr>
+                  </a:solidFill>
+                  <a:sym typeface="+mn-ea"/>
+                </a:rPr>
+                <a:t> perf B.4</a:t>
+              </a:r>
+              <a:endParaRPr lang="en-US" altLang="en-US" sz="1400" b="1" i="1">
+                <a:solidFill>
+                  <a:schemeClr val="accent2">
+                    <a:lumMod val="75000"/>
+                  </a:schemeClr>
+                </a:solidFill>
+                <a:sym typeface="+mn-ea"/>
+              </a:endParaRPr>
+            </a:p>
+            <a:p>
+              <a:r>
+                <a:rPr lang="en-US" altLang="en-US" sz="1400" b="1" i="1">
+                  <a:solidFill>
+                    <a:schemeClr val="bg2">
+                      <a:lumMod val="50000"/>
+                    </a:schemeClr>
+                  </a:solidFill>
+                  <a:sym typeface="+mn-ea"/>
+                </a:rPr>
+                <a:t>Model C |</a:t>
+              </a:r>
+              <a:r>
+                <a:rPr lang="en-US" altLang="en-US" sz="1400" b="1" i="1">
+                  <a:solidFill>
+                    <a:schemeClr val="accent2">
+                      <a:lumMod val="75000"/>
+                    </a:schemeClr>
+                  </a:solidFill>
+                  <a:sym typeface="+mn-ea"/>
+                </a:rPr>
+                <a:t> perf C.4</a:t>
+              </a:r>
+              <a:endParaRPr lang="en-US" altLang="en-US" sz="1400" b="1" i="1">
+                <a:solidFill>
+                  <a:schemeClr val="accent2">
+                    <a:lumMod val="75000"/>
+                  </a:schemeClr>
+                </a:solidFill>
+              </a:endParaRPr>
+            </a:p>
+          </p:txBody>
+        </p:sp>
+      </p:grpSp>
+      <p:sp>
+        <p:nvSpPr>
+          <p:cNvPr id="51" name="Text Box 50"/>
+          <p:cNvSpPr txBox="1"/>
+          <p:nvPr/>
+        </p:nvSpPr>
+        <p:spPr>
+          <a:xfrm>
+            <a:off x="10028555" y="4094480"/>
+            <a:ext cx="1861185" cy="1198880"/>
+          </a:xfrm>
+          <a:prstGeom prst="rect">
+            <a:avLst/>
+          </a:prstGeom>
+          <a:noFill/>
+        </p:spPr>
+        <p:txBody>
+          <a:bodyPr wrap="square" rtlCol="0">
+            <a:spAutoFit/>
+          </a:bodyPr>
+          <a:p>
+            <a:pPr algn="ctr"/>
+            <a:r>
+              <a:rPr lang="en-US" altLang="en-US" b="1" i="1">
+                <a:solidFill>
+                  <a:schemeClr val="bg2">
+                    <a:lumMod val="50000"/>
+                  </a:schemeClr>
+                </a:solidFill>
+              </a:rPr>
+              <a:t>Model A |</a:t>
+            </a:r>
+            <a:r>
+              <a:rPr lang="en-US" altLang="en-US" b="1" i="1">
+                <a:solidFill>
+                  <a:schemeClr val="accent2">
+                    <a:lumMod val="75000"/>
+                  </a:schemeClr>
+                </a:solidFill>
+              </a:rPr>
+              <a:t> perf</a:t>
+            </a:r>
+            <a:endParaRPr lang="en-US" altLang="en-US" b="1" i="1">
+              <a:solidFill>
+                <a:schemeClr val="accent2">
+                  <a:lumMod val="75000"/>
+                </a:schemeClr>
+              </a:solidFill>
+            </a:endParaRPr>
+          </a:p>
+          <a:p>
+            <a:pPr algn="ctr"/>
+            <a:r>
+              <a:rPr lang="en-US" altLang="en-US" b="1" i="1">
+                <a:solidFill>
+                  <a:schemeClr val="bg2">
+                    <a:lumMod val="50000"/>
+                  </a:schemeClr>
+                </a:solidFill>
+              </a:rPr>
+              <a:t>Model B |</a:t>
+            </a:r>
+            <a:r>
+              <a:rPr lang="en-US" altLang="en-US" b="1" i="1">
+                <a:solidFill>
+                  <a:schemeClr val="accent2">
+                    <a:lumMod val="75000"/>
+                  </a:schemeClr>
+                </a:solidFill>
+              </a:rPr>
+              <a:t> perf</a:t>
+            </a:r>
+            <a:endParaRPr lang="en-US" altLang="en-US" b="1" i="1">
+              <a:solidFill>
+                <a:schemeClr val="accent2">
+                  <a:lumMod val="75000"/>
+                </a:schemeClr>
+              </a:solidFill>
+            </a:endParaRPr>
+          </a:p>
+          <a:p>
+            <a:pPr algn="ctr"/>
+            <a:r>
+              <a:rPr lang="en-US" altLang="en-US" b="1" i="1">
+                <a:solidFill>
+                  <a:schemeClr val="bg2">
+                    <a:lumMod val="50000"/>
+                  </a:schemeClr>
+                </a:solidFill>
+              </a:rPr>
+              <a:t>Model C |</a:t>
+            </a:r>
+            <a:r>
+              <a:rPr lang="en-US" altLang="en-US" b="1" i="1">
+                <a:solidFill>
+                  <a:schemeClr val="accent2">
+                    <a:lumMod val="75000"/>
+                  </a:schemeClr>
+                </a:solidFill>
+              </a:rPr>
+              <a:t> perf</a:t>
+            </a:r>
+            <a:endParaRPr lang="en-US" altLang="en-US" b="1" i="1">
+              <a:solidFill>
+                <a:schemeClr val="accent2">
+                  <a:lumMod val="75000"/>
+                </a:schemeClr>
+              </a:solidFill>
+            </a:endParaRPr>
+          </a:p>
+          <a:p>
+            <a:pPr algn="ctr"/>
+            <a:r>
+              <a:rPr lang="en-US" altLang="en-US" b="1" i="1">
+                <a:solidFill>
+                  <a:schemeClr val="accent2">
+                    <a:lumMod val="75000"/>
+                  </a:schemeClr>
+                </a:solidFill>
+              </a:rPr>
+              <a:t>(average)</a:t>
+            </a:r>
+            <a:endParaRPr lang="en-US" altLang="en-US" b="1" i="1">
+              <a:solidFill>
+                <a:schemeClr val="accent2">
+                  <a:lumMod val="75000"/>
+                </a:schemeClr>
+              </a:solidFill>
+            </a:endParaRPr>
+          </a:p>
+        </p:txBody>
+      </p:sp>
+      <p:sp>
+        <p:nvSpPr>
+          <p:cNvPr id="4" name="Rounded Rectangle 3"/>
+          <p:cNvSpPr/>
+          <p:nvPr/>
+        </p:nvSpPr>
+        <p:spPr>
+          <a:xfrm>
+            <a:off x="603250" y="445135"/>
+            <a:ext cx="6192520" cy="710565"/>
+          </a:xfrm>
+          <a:prstGeom prst="roundRect">
+            <a:avLst/>
+          </a:prstGeom>
+          <a:solidFill>
+            <a:schemeClr val="accent1">
+              <a:lumMod val="60000"/>
+              <a:lumOff val="40000"/>
+            </a:schemeClr>
+          </a:solidFill>
+          <a:ln w="50800" cmpd="sng">
+            <a:solidFill>
+              <a:schemeClr val="accent1">
+                <a:lumMod val="75000"/>
+              </a:schemeClr>
+            </a:solidFill>
+            <a:prstDash val="solid"/>
+          </a:ln>
+        </p:spPr>
+        <p:style>
+          <a:lnRef idx="2">
+            <a:schemeClr val="accent1">
+              <a:shade val="50000"/>
+            </a:schemeClr>
+          </a:lnRef>
+          <a:fillRef idx="1">
+            <a:schemeClr val="accent1"/>
+          </a:fillRef>
+          <a:effectRef idx="0">
+            <a:schemeClr val="accent1"/>
+          </a:effectRef>
+          <a:fontRef idx="minor">
+            <a:schemeClr val="lt1"/>
+          </a:fontRef>
+        </p:style>
+        <p:txBody>
+          <a:bodyPr rtlCol="0" anchor="ctr"/>
+          <a:p>
+            <a:pPr algn="ctr"/>
+            <a:r>
+              <a:rPr lang="en-US" altLang="en-US" b="1">
+                <a:solidFill>
+                  <a:schemeClr val="accent1">
+                    <a:lumMod val="50000"/>
+                  </a:schemeClr>
+                </a:solidFill>
+                <a:sym typeface="+mn-ea"/>
+              </a:rPr>
+              <a:t>CROSS-VALIDATION DATA</a:t>
+            </a:r>
+            <a:endParaRPr lang="en-US" altLang="en-US" b="1">
+              <a:solidFill>
+                <a:schemeClr val="accent1">
+                  <a:lumMod val="50000"/>
+                </a:schemeClr>
+              </a:solidFill>
+              <a:sym typeface="+mn-ea"/>
+            </a:endParaRPr>
+          </a:p>
+        </p:txBody>
+      </p:sp>
+      <p:sp>
+        <p:nvSpPr>
+          <p:cNvPr id="5" name="Text Box 4"/>
+          <p:cNvSpPr txBox="1"/>
+          <p:nvPr/>
+        </p:nvSpPr>
+        <p:spPr>
+          <a:xfrm rot="16200000">
+            <a:off x="-72390" y="3181985"/>
+            <a:ext cx="697230" cy="306705"/>
+          </a:xfrm>
+          <a:prstGeom prst="rect">
+            <a:avLst/>
+          </a:prstGeom>
+          <a:noFill/>
+        </p:spPr>
+        <p:txBody>
+          <a:bodyPr wrap="none" rtlCol="0" anchor="t">
+            <a:spAutoFit/>
+          </a:bodyPr>
+          <a:p>
+            <a:r>
+              <a:rPr lang="en-US" altLang="en-US" sz="1400" b="1">
+                <a:solidFill>
+                  <a:schemeClr val="accent1">
+                    <a:lumMod val="50000"/>
+                  </a:schemeClr>
+                </a:solidFill>
+                <a:sym typeface="+mn-ea"/>
+              </a:rPr>
+              <a:t>split 1</a:t>
+            </a:r>
+            <a:endParaRPr lang="en-US" altLang="en-US" sz="1400" b="1">
+              <a:solidFill>
+                <a:schemeClr val="accent1">
+                  <a:lumMod val="50000"/>
+                </a:schemeClr>
+              </a:solidFill>
+              <a:sym typeface="+mn-ea"/>
+            </a:endParaRPr>
+          </a:p>
+        </p:txBody>
+      </p:sp>
+      <p:sp>
+        <p:nvSpPr>
+          <p:cNvPr id="6" name="Text Box 5"/>
+          <p:cNvSpPr txBox="1"/>
+          <p:nvPr/>
+        </p:nvSpPr>
+        <p:spPr>
+          <a:xfrm rot="16200000">
+            <a:off x="-72390" y="4005580"/>
+            <a:ext cx="697230" cy="306705"/>
+          </a:xfrm>
+          <a:prstGeom prst="rect">
+            <a:avLst/>
+          </a:prstGeom>
+          <a:noFill/>
+        </p:spPr>
+        <p:txBody>
+          <a:bodyPr wrap="none" rtlCol="0" anchor="t">
+            <a:spAutoFit/>
+          </a:bodyPr>
+          <a:p>
+            <a:r>
+              <a:rPr lang="en-US" altLang="en-US" sz="1400" b="1">
+                <a:solidFill>
+                  <a:schemeClr val="accent1">
+                    <a:lumMod val="50000"/>
+                  </a:schemeClr>
+                </a:solidFill>
+                <a:sym typeface="+mn-ea"/>
+              </a:rPr>
+              <a:t>split 2</a:t>
+            </a:r>
+            <a:endParaRPr lang="en-US" altLang="en-US" sz="1400" b="1">
+              <a:solidFill>
+                <a:schemeClr val="accent1">
+                  <a:lumMod val="50000"/>
+                </a:schemeClr>
+              </a:solidFill>
+              <a:sym typeface="+mn-ea"/>
+            </a:endParaRPr>
+          </a:p>
+        </p:txBody>
+      </p:sp>
+      <p:sp>
+        <p:nvSpPr>
+          <p:cNvPr id="7" name="Text Box 6"/>
+          <p:cNvSpPr txBox="1"/>
+          <p:nvPr/>
+        </p:nvSpPr>
+        <p:spPr>
+          <a:xfrm rot="16200000">
+            <a:off x="-72390" y="4862830"/>
+            <a:ext cx="697230" cy="306705"/>
+          </a:xfrm>
+          <a:prstGeom prst="rect">
+            <a:avLst/>
+          </a:prstGeom>
+          <a:noFill/>
+        </p:spPr>
+        <p:txBody>
+          <a:bodyPr wrap="none" rtlCol="0" anchor="t">
+            <a:spAutoFit/>
+          </a:bodyPr>
+          <a:p>
+            <a:r>
+              <a:rPr lang="en-US" altLang="en-US" sz="1400" b="1">
+                <a:solidFill>
+                  <a:schemeClr val="accent1">
+                    <a:lumMod val="50000"/>
+                  </a:schemeClr>
+                </a:solidFill>
+                <a:sym typeface="+mn-ea"/>
+              </a:rPr>
+              <a:t>split 3</a:t>
+            </a:r>
+            <a:endParaRPr lang="en-US" altLang="en-US" sz="1400" b="1">
+              <a:solidFill>
+                <a:schemeClr val="accent1">
+                  <a:lumMod val="50000"/>
+                </a:schemeClr>
+              </a:solidFill>
+              <a:sym typeface="+mn-ea"/>
+            </a:endParaRPr>
+          </a:p>
+        </p:txBody>
+      </p:sp>
+      <p:sp>
+        <p:nvSpPr>
+          <p:cNvPr id="9" name="Text Box 8"/>
+          <p:cNvSpPr txBox="1"/>
+          <p:nvPr/>
+        </p:nvSpPr>
+        <p:spPr>
+          <a:xfrm rot="16200000">
+            <a:off x="-72390" y="5723890"/>
+            <a:ext cx="697230" cy="306705"/>
+          </a:xfrm>
+          <a:prstGeom prst="rect">
+            <a:avLst/>
+          </a:prstGeom>
+          <a:noFill/>
+        </p:spPr>
+        <p:txBody>
+          <a:bodyPr wrap="none" rtlCol="0" anchor="t">
+            <a:spAutoFit/>
+          </a:bodyPr>
+          <a:p>
+            <a:r>
+              <a:rPr lang="en-US" altLang="en-US" sz="1400" b="1">
+                <a:solidFill>
+                  <a:schemeClr val="accent1">
+                    <a:lumMod val="50000"/>
+                  </a:schemeClr>
+                </a:solidFill>
+                <a:sym typeface="+mn-ea"/>
+              </a:rPr>
+              <a:t>split 4</a:t>
+            </a:r>
+            <a:endParaRPr lang="en-US" altLang="en-US" sz="1400" b="1">
+              <a:solidFill>
+                <a:schemeClr val="accent1">
+                  <a:lumMod val="50000"/>
+                </a:schemeClr>
+              </a:solidFill>
+              <a:sym typeface="+mn-ea"/>
+            </a:endParaRPr>
+          </a:p>
+        </p:txBody>
+      </p:sp>
+    </p:spTree>
+  </p:cSld>
+  <p:clrMapOvr>
+    <a:masterClrMapping/>
+  </p:clrMapOvr>
+</p:sld>
+</file>
+
+<file path=ppt/slides/slide11.xml><?xml version="1.0" encoding="utf-8"?>
+<p:sld xmlns:a="http://schemas.openxmlformats.org/drawingml/2006/main" xmlns:r="http://schemas.openxmlformats.org/officeDocument/2006/relationships" xmlns:p="http://schemas.openxmlformats.org/presentationml/2006/main">
+  <p:cSld>
+    <p:spTree>
+      <p:nvGrpSpPr>
+        <p:cNvPr id="1" name=""/>
+        <p:cNvGrpSpPr/>
+        <p:nvPr/>
+      </p:nvGrpSpPr>
+      <p:grpSpPr/>
       <p:sp>
         <p:nvSpPr>
           <p:cNvPr id="94" name="Rounded Rectangle 93"/>
@@ -6157,7 +8360,7 @@
 </p:sld>
 </file>
 
-<file path=ppt/slides/slide11.xml><?xml version="1.0" encoding="utf-8"?>
+<file path=ppt/slides/slide12.xml><?xml version="1.0" encoding="utf-8"?>
 <p:sld xmlns:a="http://schemas.openxmlformats.org/drawingml/2006/main" xmlns:r="http://schemas.openxmlformats.org/officeDocument/2006/relationships" xmlns:p="http://schemas.openxmlformats.org/presentationml/2006/main">
   <p:cSld>
     <p:spTree>
@@ -7001,7 +9204,7 @@
 </p:sld>
 </file>
 
-<file path=ppt/slides/slide12.xml><?xml version="1.0" encoding="utf-8"?>
+<file path=ppt/slides/slide13.xml><?xml version="1.0" encoding="utf-8"?>
 <p:sld xmlns:a="http://schemas.openxmlformats.org/drawingml/2006/main" xmlns:r="http://schemas.openxmlformats.org/officeDocument/2006/relationships" xmlns:p="http://schemas.openxmlformats.org/presentationml/2006/main" show="0">
   <p:cSld>
     <p:spTree>
@@ -14536,7 +16739,7 @@
         </p:nvGrpSpPr>
         <p:grpSpPr>
           <a:xfrm>
-            <a:off x="603250" y="1733550"/>
+            <a:off x="603250" y="1466850"/>
             <a:ext cx="9731118" cy="4230555"/>
             <a:chOff x="1774" y="2073"/>
             <a:chExt cx="14693" cy="7450"/>
@@ -15869,7 +18072,7 @@
             </a:bodyPr>
             <a:p>
               <a:r>
-                <a:rPr lang="" altLang="en-US" sz="1400" b="1" i="1">
+                <a:rPr lang="en-US" altLang="en-US" sz="1400" b="1" i="1">
                   <a:solidFill>
                     <a:schemeClr val="bg2">
                       <a:lumMod val="50000"/>
@@ -15877,18 +18080,7 @@
                   </a:solidFill>
                   <a:sym typeface="+mn-ea"/>
                 </a:rPr>
-                <a:t>Estimator </a:t>
-              </a:r>
-              <a:r>
-                <a:rPr lang="en-US" altLang="en-US" sz="1400" b="1" i="1">
-                  <a:solidFill>
-                    <a:schemeClr val="bg2">
-                      <a:lumMod val="50000"/>
-                    </a:schemeClr>
-                  </a:solidFill>
-                  <a:sym typeface="+mn-ea"/>
-                </a:rPr>
-                <a:t>A |</a:t>
+                <a:t>Estimator A |</a:t>
               </a:r>
               <a:r>
                 <a:rPr lang="en-US" altLang="en-US" sz="1400" b="1" i="1">
@@ -15920,18 +18112,7 @@
                   </a:solidFill>
                   <a:sym typeface="+mn-ea"/>
                 </a:rPr>
-                <a:t>Estimator </a:t>
-              </a:r>
-              <a:r>
-                <a:rPr lang="en-US" altLang="en-US" sz="1400" b="1" i="1">
-                  <a:solidFill>
-                    <a:schemeClr val="bg2">
-                      <a:lumMod val="50000"/>
-                    </a:schemeClr>
-                  </a:solidFill>
-                  <a:sym typeface="+mn-ea"/>
-                </a:rPr>
-                <a:t>B |</a:t>
+                <a:t>Estimator B |</a:t>
               </a:r>
               <a:r>
                 <a:rPr lang="en-US" altLang="en-US" sz="1400" b="1" i="1">
@@ -15955,7 +18136,7 @@
             </a:p>
             <a:p>
               <a:r>
-                <a:rPr lang="" altLang="en-US" sz="1400" b="1" i="1">
+                <a:rPr lang="en-US" altLang="en-US" sz="1400" b="1" i="1">
                   <a:solidFill>
                     <a:schemeClr val="bg2">
                       <a:lumMod val="50000"/>
@@ -15963,18 +18144,7 @@
                   </a:solidFill>
                   <a:sym typeface="+mn-ea"/>
                 </a:rPr>
-                <a:t>Estimator </a:t>
-              </a:r>
-              <a:r>
-                <a:rPr lang="en-US" altLang="en-US" sz="1400" b="1" i="1">
-                  <a:solidFill>
-                    <a:schemeClr val="bg2">
-                      <a:lumMod val="50000"/>
-                    </a:schemeClr>
-                  </a:solidFill>
-                  <a:sym typeface="+mn-ea"/>
-                </a:rPr>
-                <a:t>C |</a:t>
+                <a:t>Estimator C |</a:t>
               </a:r>
               <a:r>
                 <a:rPr lang="en-US" altLang="en-US" sz="1400" b="1" i="1">
@@ -16029,7 +18199,7 @@
             </a:bodyPr>
             <a:p>
               <a:r>
-                <a:rPr lang="" altLang="en-US" sz="1400" b="1" i="1">
+                <a:rPr lang="en-US" altLang="en-US" sz="1400" b="1" i="1">
                   <a:solidFill>
                     <a:schemeClr val="bg2">
                       <a:lumMod val="50000"/>
@@ -16037,18 +18207,7 @@
                   </a:solidFill>
                   <a:sym typeface="+mn-ea"/>
                 </a:rPr>
-                <a:t>Estimator </a:t>
-              </a:r>
-              <a:r>
-                <a:rPr lang="en-US" altLang="en-US" sz="1400" b="1" i="1">
-                  <a:solidFill>
-                    <a:schemeClr val="bg2">
-                      <a:lumMod val="50000"/>
-                    </a:schemeClr>
-                  </a:solidFill>
-                  <a:sym typeface="+mn-ea"/>
-                </a:rPr>
-                <a:t>A |</a:t>
+                <a:t>Estimator A |</a:t>
               </a:r>
               <a:r>
                 <a:rPr lang="en-US" altLang="en-US" sz="1400" b="1" i="1">
@@ -16080,18 +18239,7 @@
                   </a:solidFill>
                   <a:sym typeface="+mn-ea"/>
                 </a:rPr>
-                <a:t>Estimator </a:t>
-              </a:r>
-              <a:r>
-                <a:rPr lang="en-US" altLang="en-US" sz="1400" b="1" i="1">
-                  <a:solidFill>
-                    <a:schemeClr val="bg2">
-                      <a:lumMod val="50000"/>
-                    </a:schemeClr>
-                  </a:solidFill>
-                  <a:sym typeface="+mn-ea"/>
-                </a:rPr>
-                <a:t>B |</a:t>
+                <a:t>Estimator B |</a:t>
               </a:r>
               <a:r>
                 <a:rPr lang="en-US" altLang="en-US" sz="1400" b="1" i="1">
@@ -16123,18 +18271,7 @@
                   </a:solidFill>
                   <a:sym typeface="+mn-ea"/>
                 </a:rPr>
-                <a:t>Estimator </a:t>
-              </a:r>
-              <a:r>
-                <a:rPr lang="en-US" altLang="en-US" sz="1400" b="1" i="1">
-                  <a:solidFill>
-                    <a:schemeClr val="bg2">
-                      <a:lumMod val="50000"/>
-                    </a:schemeClr>
-                  </a:solidFill>
-                  <a:sym typeface="+mn-ea"/>
-                </a:rPr>
-                <a:t>C |</a:t>
+                <a:t>Estimator C |</a:t>
               </a:r>
               <a:r>
                 <a:rPr lang="en-US" altLang="en-US" sz="1400" b="1" i="1">
@@ -16197,18 +18334,7 @@
                   </a:solidFill>
                   <a:sym typeface="+mn-ea"/>
                 </a:rPr>
-                <a:t>Estimator </a:t>
-              </a:r>
-              <a:r>
-                <a:rPr lang="en-US" altLang="en-US" sz="1400" b="1" i="1">
-                  <a:solidFill>
-                    <a:schemeClr val="bg2">
-                      <a:lumMod val="50000"/>
-                    </a:schemeClr>
-                  </a:solidFill>
-                  <a:sym typeface="+mn-ea"/>
-                </a:rPr>
-                <a:t>A |</a:t>
+                <a:t>Estimator A |</a:t>
               </a:r>
               <a:r>
                 <a:rPr lang="en-US" altLang="en-US" sz="1400" b="1" i="1">
@@ -16240,18 +18366,7 @@
                   </a:solidFill>
                   <a:sym typeface="+mn-ea"/>
                 </a:rPr>
-                <a:t>Estimator </a:t>
-              </a:r>
-              <a:r>
-                <a:rPr lang="en-US" altLang="en-US" sz="1400" b="1" i="1">
-                  <a:solidFill>
-                    <a:schemeClr val="bg2">
-                      <a:lumMod val="50000"/>
-                    </a:schemeClr>
-                  </a:solidFill>
-                  <a:sym typeface="+mn-ea"/>
-                </a:rPr>
-                <a:t>B |</a:t>
+                <a:t>Estimator B |</a:t>
               </a:r>
               <a:r>
                 <a:rPr lang="en-US" altLang="en-US" sz="1400" b="1" i="1">
@@ -16283,18 +18398,7 @@
                   </a:solidFill>
                   <a:sym typeface="+mn-ea"/>
                 </a:rPr>
-                <a:t>Estimator </a:t>
-              </a:r>
-              <a:r>
-                <a:rPr lang="en-US" altLang="en-US" sz="1400" b="1" i="1">
-                  <a:solidFill>
-                    <a:schemeClr val="bg2">
-                      <a:lumMod val="50000"/>
-                    </a:schemeClr>
-                  </a:solidFill>
-                  <a:sym typeface="+mn-ea"/>
-                </a:rPr>
-                <a:t>C |</a:t>
+                <a:t>Estimator C |</a:t>
               </a:r>
               <a:r>
                 <a:rPr lang="en-US" altLang="en-US" sz="1400" b="1" i="1">
@@ -16348,18 +18452,7 @@
                   </a:solidFill>
                   <a:sym typeface="+mn-ea"/>
                 </a:rPr>
-                <a:t>Estimator </a:t>
-              </a:r>
-              <a:r>
-                <a:rPr lang="en-US" altLang="en-US" sz="1400" b="1" i="1">
-                  <a:solidFill>
-                    <a:schemeClr val="bg2">
-                      <a:lumMod val="50000"/>
-                    </a:schemeClr>
-                  </a:solidFill>
-                  <a:sym typeface="+mn-ea"/>
-                </a:rPr>
-                <a:t>A |</a:t>
+                <a:t>Estimator A |</a:t>
               </a:r>
               <a:r>
                 <a:rPr lang="en-US" altLang="en-US" sz="1400" b="1" i="1">
@@ -16391,18 +18484,7 @@
                   </a:solidFill>
                   <a:sym typeface="+mn-ea"/>
                 </a:rPr>
-                <a:t>Estimator </a:t>
-              </a:r>
-              <a:r>
-                <a:rPr lang="en-US" altLang="en-US" sz="1400" b="1" i="1">
-                  <a:solidFill>
-                    <a:schemeClr val="bg2">
-                      <a:lumMod val="50000"/>
-                    </a:schemeClr>
-                  </a:solidFill>
-                  <a:sym typeface="+mn-ea"/>
-                </a:rPr>
-                <a:t>B |</a:t>
+                <a:t>Estimator B |</a:t>
               </a:r>
               <a:r>
                 <a:rPr lang="en-US" altLang="en-US" sz="1400" b="1" i="1">
@@ -16434,18 +18516,7 @@
                   </a:solidFill>
                   <a:sym typeface="+mn-ea"/>
                 </a:rPr>
-                <a:t>Estimator </a:t>
-              </a:r>
-              <a:r>
-                <a:rPr lang="en-US" altLang="en-US" sz="1400" b="1" i="1">
-                  <a:solidFill>
-                    <a:schemeClr val="bg2">
-                      <a:lumMod val="50000"/>
-                    </a:schemeClr>
-                  </a:solidFill>
-                  <a:sym typeface="+mn-ea"/>
-                </a:rPr>
-                <a:t>C |</a:t>
+                <a:t>Estimator C |</a:t>
               </a:r>
               <a:r>
                 <a:rPr lang="en-US" altLang="en-US" sz="1400" b="1" i="1">
@@ -16477,7 +18548,7 @@
         </p:nvSpPr>
         <p:spPr>
           <a:xfrm>
-            <a:off x="10334625" y="3936365"/>
+            <a:off x="10334625" y="3669665"/>
             <a:ext cx="1861185" cy="953135"/>
           </a:xfrm>
           <a:prstGeom prst="rect">
@@ -16642,7 +18713,7 @@
         </p:nvSpPr>
         <p:spPr>
           <a:xfrm>
-            <a:off x="603250" y="142875"/>
+            <a:off x="603250" y="502920"/>
             <a:ext cx="6192520" cy="710565"/>
           </a:xfrm>
           <a:prstGeom prst="roundRect">
@@ -16713,7 +18784,7 @@
         </p:nvSpPr>
         <p:spPr>
           <a:xfrm rot="16200000">
-            <a:off x="-72390" y="2879725"/>
+            <a:off x="-72390" y="2613025"/>
             <a:ext cx="697230" cy="306705"/>
           </a:xfrm>
           <a:prstGeom prst="rect">
@@ -16756,7 +18827,7 @@
         </p:nvSpPr>
         <p:spPr>
           <a:xfrm rot="16200000">
-            <a:off x="-72390" y="3703320"/>
+            <a:off x="-72390" y="3436620"/>
             <a:ext cx="697230" cy="306705"/>
           </a:xfrm>
           <a:prstGeom prst="rect">
@@ -16799,7 +18870,7 @@
         </p:nvSpPr>
         <p:spPr>
           <a:xfrm rot="16200000">
-            <a:off x="-72390" y="4560570"/>
+            <a:off x="-72390" y="4293870"/>
             <a:ext cx="697230" cy="306705"/>
           </a:xfrm>
           <a:prstGeom prst="rect">
@@ -16842,7 +18913,7 @@
         </p:nvSpPr>
         <p:spPr>
           <a:xfrm rot="16200000">
-            <a:off x="-72390" y="5421630"/>
+            <a:off x="-72390" y="5154930"/>
             <a:ext cx="697230" cy="306705"/>
           </a:xfrm>
           <a:prstGeom prst="rect">
@@ -16884,8 +18955,8 @@
           <p:nvPr/>
         </p:nvSpPr>
         <p:spPr>
-          <a:xfrm>
-            <a:off x="10979785" y="4992370"/>
+          <a:xfrm rot="10800000">
+            <a:off x="10979785" y="2755900"/>
             <a:ext cx="571500" cy="812800"/>
           </a:xfrm>
           <a:prstGeom prst="downArrow">
@@ -16930,7 +19001,7 @@
         </p:nvSpPr>
         <p:spPr>
           <a:xfrm>
-            <a:off x="10510520" y="5963920"/>
+            <a:off x="10510520" y="1892935"/>
             <a:ext cx="1509395" cy="721360"/>
           </a:xfrm>
           <a:prstGeom prst="rect">
@@ -16964,10 +19035,10 @@
           <a:p>
             <a:pPr algn="ctr"/>
             <a:r>
-              <a:rPr lang="" altLang="en-US" b="1"/>
+              <a:rPr lang="en-US" altLang="en-US" b="1"/>
               <a:t>SELECT BEST</a:t>
             </a:r>
-            <a:endParaRPr lang="" altLang="en-US" b="1"/>
+            <a:endParaRPr lang="en-US" altLang="en-US" b="1"/>
           </a:p>
         </p:txBody>
       </p:sp>
@@ -16997,10 +19068,10 @@
         </p:nvGrpSpPr>
         <p:grpSpPr>
           <a:xfrm>
-            <a:off x="603250" y="2035810"/>
-            <a:ext cx="9425799" cy="4230555"/>
+            <a:off x="603250" y="1466850"/>
+            <a:ext cx="9731118" cy="4230555"/>
             <a:chOff x="1774" y="2073"/>
-            <a:chExt cx="14232" cy="7450"/>
+            <a:chExt cx="14693" cy="7450"/>
           </a:xfrm>
         </p:grpSpPr>
         <p:sp>
@@ -17011,8 +19082,8 @@
           </p:nvSpPr>
           <p:spPr>
             <a:xfrm>
-              <a:off x="11528" y="3748"/>
-              <a:ext cx="4478" cy="5775"/>
+              <a:off x="11327" y="3748"/>
+              <a:ext cx="5140" cy="5775"/>
             </a:xfrm>
             <a:prstGeom prst="rightArrowCallout">
               <a:avLst/>
@@ -18316,8 +20387,168 @@
           </p:nvSpPr>
           <p:spPr>
             <a:xfrm>
-              <a:off x="11585" y="3900"/>
-              <a:ext cx="2791" cy="1298"/>
+              <a:off x="11408" y="3900"/>
+              <a:ext cx="3335" cy="1298"/>
+            </a:xfrm>
+            <a:prstGeom prst="rect">
+              <a:avLst/>
+            </a:prstGeom>
+            <a:noFill/>
+          </p:spPr>
+          <p:txBody>
+            <a:bodyPr wrap="square" rtlCol="0">
+              <a:spAutoFit/>
+            </a:bodyPr>
+            <a:p>
+              <a:r>
+                <a:rPr lang="" altLang="en-US" sz="1400" b="1" i="1">
+                  <a:solidFill>
+                    <a:schemeClr val="bg2">
+                      <a:lumMod val="50000"/>
+                    </a:schemeClr>
+                  </a:solidFill>
+                  <a:sym typeface="+mn-ea"/>
+                </a:rPr>
+                <a:t>Model </a:t>
+              </a:r>
+              <a:r>
+                <a:rPr lang="en-US" altLang="en-US" sz="1400" b="1" i="1">
+                  <a:solidFill>
+                    <a:schemeClr val="bg2">
+                      <a:lumMod val="50000"/>
+                    </a:schemeClr>
+                  </a:solidFill>
+                  <a:sym typeface="+mn-ea"/>
+                </a:rPr>
+                <a:t>A |</a:t>
+              </a:r>
+              <a:r>
+                <a:rPr lang="en-US" altLang="en-US" sz="1400" b="1" i="1">
+                  <a:solidFill>
+                    <a:schemeClr val="accent2">
+                      <a:lumMod val="75000"/>
+                    </a:schemeClr>
+                  </a:solidFill>
+                  <a:sym typeface="+mn-ea"/>
+                </a:rPr>
+                <a:t> perf A.1</a:t>
+              </a:r>
+              <a:endParaRPr lang="en-US" altLang="en-US" sz="1400" b="1" i="1">
+                <a:solidFill>
+                  <a:schemeClr val="accent2">
+                    <a:lumMod val="75000"/>
+                  </a:schemeClr>
+                </a:solidFill>
+                <a:sym typeface="+mn-ea"/>
+              </a:endParaRPr>
+            </a:p>
+            <a:p>
+              <a:r>
+                <a:rPr lang="en-US" altLang="en-US" sz="1400" b="1" i="1">
+                  <a:solidFill>
+                    <a:schemeClr val="bg2">
+                      <a:lumMod val="50000"/>
+                    </a:schemeClr>
+                  </a:solidFill>
+                  <a:sym typeface="+mn-ea"/>
+                </a:rPr>
+                <a:t>Model </a:t>
+              </a:r>
+              <a:r>
+                <a:rPr lang="en-US" altLang="en-US" sz="1400" b="1" i="1">
+                  <a:solidFill>
+                    <a:schemeClr val="bg2">
+                      <a:lumMod val="50000"/>
+                    </a:schemeClr>
+                  </a:solidFill>
+                  <a:sym typeface="+mn-ea"/>
+                </a:rPr>
+                <a:t>B |</a:t>
+              </a:r>
+              <a:r>
+                <a:rPr lang="en-US" altLang="en-US" sz="1400" b="1" i="1">
+                  <a:solidFill>
+                    <a:schemeClr val="accent2">
+                      <a:lumMod val="75000"/>
+                    </a:schemeClr>
+                  </a:solidFill>
+                  <a:sym typeface="+mn-ea"/>
+                </a:rPr>
+                <a:t> perf B.1</a:t>
+              </a:r>
+              <a:endParaRPr lang="en-US" altLang="en-US" sz="1400" b="1" i="1">
+                <a:solidFill>
+                  <a:schemeClr val="accent2">
+                    <a:lumMod val="75000"/>
+                  </a:schemeClr>
+                </a:solidFill>
+                <a:sym typeface="+mn-ea"/>
+              </a:endParaRPr>
+            </a:p>
+            <a:p>
+              <a:r>
+                <a:rPr lang="en-US" altLang="en-US" sz="1400" b="1" i="1">
+                  <a:solidFill>
+                    <a:schemeClr val="bg2">
+                      <a:lumMod val="50000"/>
+                    </a:schemeClr>
+                  </a:solidFill>
+                  <a:sym typeface="+mn-ea"/>
+                </a:rPr>
+                <a:t>Model </a:t>
+              </a:r>
+              <a:r>
+                <a:rPr lang="en-US" altLang="en-US" sz="1400" b="1" i="1">
+                  <a:solidFill>
+                    <a:schemeClr val="bg2">
+                      <a:lumMod val="50000"/>
+                    </a:schemeClr>
+                  </a:solidFill>
+                  <a:sym typeface="+mn-ea"/>
+                </a:rPr>
+                <a:t>C |</a:t>
+              </a:r>
+              <a:r>
+                <a:rPr lang="en-US" altLang="en-US" sz="1400" b="1" i="1">
+                  <a:solidFill>
+                    <a:schemeClr val="accent2">
+                      <a:lumMod val="75000"/>
+                    </a:schemeClr>
+                  </a:solidFill>
+                  <a:sym typeface="+mn-ea"/>
+                </a:rPr>
+                <a:t> perf C.1</a:t>
+              </a:r>
+              <a:r>
+                <a:rPr lang="en-US" altLang="en-US" sz="1400" b="1" i="1">
+                  <a:solidFill>
+                    <a:schemeClr val="accent2">
+                      <a:lumMod val="75000"/>
+                    </a:schemeClr>
+                  </a:solidFill>
+                </a:rPr>
+                <a:t>...</a:t>
+              </a:r>
+              <a:endParaRPr lang="en-US" altLang="en-US" sz="1400" b="1" i="1">
+                <a:solidFill>
+                  <a:schemeClr val="accent2">
+                    <a:lumMod val="75000"/>
+                  </a:schemeClr>
+                </a:solidFill>
+              </a:endParaRPr>
+            </a:p>
+          </p:txBody>
+        </p:sp>
+        <p:sp>
+          <p:nvSpPr>
+            <p:cNvPr id="46" name="Text Box 45"/>
+            <p:cNvSpPr txBox="1"/>
+            <p:nvPr/>
+          </p:nvSpPr>
+          <p:spPr>
+            <a:xfrm>
+              <a:off x="11469" y="5240"/>
+              <a:ext cx="3274" cy="1732"/>
             </a:xfrm>
             <a:prstGeom prst="rect">
               <a:avLst/>
@@ -18338,18 +20569,29 @@
                   </a:solidFill>
                   <a:sym typeface="+mn-ea"/>
                 </a:rPr>
-                <a:t>Model A |</a:t>
+                <a:t>Model </a:t>
               </a:r>
               <a:r>
                 <a:rPr lang="en-US" altLang="en-US" sz="1400" b="1" i="1">
                   <a:solidFill>
+                    <a:schemeClr val="bg2">
+                      <a:lumMod val="50000"/>
+                    </a:schemeClr>
+                  </a:solidFill>
+                  <a:sym typeface="+mn-ea"/>
+                </a:rPr>
+                <a:t>A |</a:t>
+              </a:r>
+              <a:r>
+                <a:rPr lang="en-US" altLang="en-US" sz="1400" b="1" i="1">
+                  <a:solidFill>
                     <a:schemeClr val="accent2">
                       <a:lumMod val="75000"/>
                     </a:schemeClr>
                   </a:solidFill>
                   <a:sym typeface="+mn-ea"/>
                 </a:rPr>
-                <a:t> perf A.1</a:t>
+                <a:t> perf A.2</a:t>
               </a:r>
               <a:endParaRPr lang="en-US" altLang="en-US" sz="1400" b="1" i="1">
                 <a:solidFill>
@@ -18370,18 +20612,29 @@
                   </a:solidFill>
                   <a:sym typeface="+mn-ea"/>
                 </a:rPr>
-                <a:t>Model B |</a:t>
+                <a:t>Model </a:t>
               </a:r>
               <a:r>
                 <a:rPr lang="en-US" altLang="en-US" sz="1400" b="1" i="1">
                   <a:solidFill>
+                    <a:schemeClr val="bg2">
+                      <a:lumMod val="50000"/>
+                    </a:schemeClr>
+                  </a:solidFill>
+                  <a:sym typeface="+mn-ea"/>
+                </a:rPr>
+                <a:t>B |</a:t>
+              </a:r>
+              <a:r>
+                <a:rPr lang="en-US" altLang="en-US" sz="1400" b="1" i="1">
+                  <a:solidFill>
                     <a:schemeClr val="accent2">
                       <a:lumMod val="75000"/>
                     </a:schemeClr>
                   </a:solidFill>
                   <a:sym typeface="+mn-ea"/>
                 </a:rPr>
-                <a:t> perf B.1</a:t>
+                <a:t> perf B.2</a:t>
               </a:r>
               <a:endParaRPr lang="en-US" altLang="en-US" sz="1400" b="1" i="1">
                 <a:solidFill>
@@ -18402,18 +20655,18 @@
                   </a:solidFill>
                   <a:sym typeface="+mn-ea"/>
                 </a:rPr>
-                <a:t>Model C |</a:t>
+                <a:t>Model </a:t>
               </a:r>
               <a:r>
                 <a:rPr lang="en-US" altLang="en-US" sz="1400" b="1" i="1">
                   <a:solidFill>
-                    <a:schemeClr val="accent2">
-                      <a:lumMod val="75000"/>
+                    <a:schemeClr val="bg2">
+                      <a:lumMod val="50000"/>
                     </a:schemeClr>
                   </a:solidFill>
                   <a:sym typeface="+mn-ea"/>
                 </a:rPr>
-                <a:t> perf C.1</a:t>
+                <a:t>C |</a:t>
               </a:r>
               <a:r>
                 <a:rPr lang="en-US" altLang="en-US" sz="1400" b="1" i="1">
@@ -18422,10 +20675,21 @@
                       <a:lumMod val="75000"/>
                     </a:schemeClr>
                   </a:solidFill>
+                  <a:sym typeface="+mn-ea"/>
                 </a:rPr>
-                <a:t>...</a:t>
+                <a:t> perf C.2</a:t>
               </a:r>
               <a:endParaRPr lang="en-US" altLang="en-US" sz="1400" b="1" i="1">
+                <a:solidFill>
+                  <a:schemeClr val="accent2">
+                    <a:lumMod val="75000"/>
+                  </a:schemeClr>
+                </a:solidFill>
+                <a:sym typeface="+mn-ea"/>
+              </a:endParaRPr>
+            </a:p>
+            <a:p>
+              <a:endParaRPr lang="en-US" altLang="en-US" sz="1600" b="1" i="1">
                 <a:solidFill>
                   <a:schemeClr val="accent2">
                     <a:lumMod val="75000"/>
@@ -18437,14 +20701,14 @@
         </p:sp>
         <p:sp>
           <p:nvSpPr>
-            <p:cNvPr id="46" name="Text Box 45"/>
+            <p:cNvPr id="47" name="Text Box 46"/>
             <p:cNvSpPr txBox="1"/>
             <p:nvPr/>
           </p:nvSpPr>
           <p:spPr>
             <a:xfrm>
-              <a:off x="11646" y="5240"/>
-              <a:ext cx="2791" cy="1732"/>
+              <a:off x="11469" y="6708"/>
+              <a:ext cx="3274" cy="1298"/>
             </a:xfrm>
             <a:prstGeom prst="rect">
               <a:avLst/>
@@ -18465,134 +20729,18 @@
                   </a:solidFill>
                   <a:sym typeface="+mn-ea"/>
                 </a:rPr>
-                <a:t>Model A |</a:t>
+                <a:t>Model </a:t>
               </a:r>
               <a:r>
                 <a:rPr lang="en-US" altLang="en-US" sz="1400" b="1" i="1">
                   <a:solidFill>
-                    <a:schemeClr val="accent2">
-                      <a:lumMod val="75000"/>
+                    <a:schemeClr val="bg2">
+                      <a:lumMod val="50000"/>
                     </a:schemeClr>
                   </a:solidFill>
                   <a:sym typeface="+mn-ea"/>
                 </a:rPr>
-                <a:t> perf A.2</a:t>
-              </a:r>
-              <a:endParaRPr lang="en-US" altLang="en-US" sz="1400" b="1" i="1">
-                <a:solidFill>
-                  <a:schemeClr val="accent2">
-                    <a:lumMod val="75000"/>
-                  </a:schemeClr>
-                </a:solidFill>
-                <a:sym typeface="+mn-ea"/>
-              </a:endParaRPr>
-            </a:p>
-            <a:p>
-              <a:r>
-                <a:rPr lang="en-US" altLang="en-US" sz="1400" b="1" i="1">
-                  <a:solidFill>
-                    <a:schemeClr val="bg2">
-                      <a:lumMod val="50000"/>
-                    </a:schemeClr>
-                  </a:solidFill>
-                  <a:sym typeface="+mn-ea"/>
-                </a:rPr>
-                <a:t>Model B |</a:t>
-              </a:r>
-              <a:r>
-                <a:rPr lang="en-US" altLang="en-US" sz="1400" b="1" i="1">
-                  <a:solidFill>
-                    <a:schemeClr val="accent2">
-                      <a:lumMod val="75000"/>
-                    </a:schemeClr>
-                  </a:solidFill>
-                  <a:sym typeface="+mn-ea"/>
-                </a:rPr>
-                <a:t> perf B.2</a:t>
-              </a:r>
-              <a:endParaRPr lang="en-US" altLang="en-US" sz="1400" b="1" i="1">
-                <a:solidFill>
-                  <a:schemeClr val="accent2">
-                    <a:lumMod val="75000"/>
-                  </a:schemeClr>
-                </a:solidFill>
-                <a:sym typeface="+mn-ea"/>
-              </a:endParaRPr>
-            </a:p>
-            <a:p>
-              <a:r>
-                <a:rPr lang="en-US" altLang="en-US" sz="1400" b="1" i="1">
-                  <a:solidFill>
-                    <a:schemeClr val="bg2">
-                      <a:lumMod val="50000"/>
-                    </a:schemeClr>
-                  </a:solidFill>
-                  <a:sym typeface="+mn-ea"/>
-                </a:rPr>
-                <a:t>Model C |</a:t>
-              </a:r>
-              <a:r>
-                <a:rPr lang="en-US" altLang="en-US" sz="1400" b="1" i="1">
-                  <a:solidFill>
-                    <a:schemeClr val="accent2">
-                      <a:lumMod val="75000"/>
-                    </a:schemeClr>
-                  </a:solidFill>
-                  <a:sym typeface="+mn-ea"/>
-                </a:rPr>
-                <a:t> perf C.2</a:t>
-              </a:r>
-              <a:endParaRPr lang="en-US" altLang="en-US" sz="1400" b="1" i="1">
-                <a:solidFill>
-                  <a:schemeClr val="accent2">
-                    <a:lumMod val="75000"/>
-                  </a:schemeClr>
-                </a:solidFill>
-                <a:sym typeface="+mn-ea"/>
-              </a:endParaRPr>
-            </a:p>
-            <a:p>
-              <a:endParaRPr lang="en-US" altLang="en-US" sz="1600" b="1" i="1">
-                <a:solidFill>
-                  <a:schemeClr val="accent2">
-                    <a:lumMod val="75000"/>
-                  </a:schemeClr>
-                </a:solidFill>
-              </a:endParaRPr>
-            </a:p>
-          </p:txBody>
-        </p:sp>
-        <p:sp>
-          <p:nvSpPr>
-            <p:cNvPr id="47" name="Text Box 46"/>
-            <p:cNvSpPr txBox="1"/>
-            <p:nvPr/>
-          </p:nvSpPr>
-          <p:spPr>
-            <a:xfrm>
-              <a:off x="11646" y="6708"/>
-              <a:ext cx="2791" cy="1298"/>
-            </a:xfrm>
-            <a:prstGeom prst="rect">
-              <a:avLst/>
-            </a:prstGeom>
-            <a:noFill/>
-          </p:spPr>
-          <p:txBody>
-            <a:bodyPr wrap="square" rtlCol="0">
-              <a:spAutoFit/>
-            </a:bodyPr>
-            <a:p>
-              <a:r>
-                <a:rPr lang="en-US" altLang="en-US" sz="1400" b="1" i="1">
-                  <a:solidFill>
-                    <a:schemeClr val="bg2">
-                      <a:lumMod val="50000"/>
-                    </a:schemeClr>
-                  </a:solidFill>
-                  <a:sym typeface="+mn-ea"/>
-                </a:rPr>
-                <a:t>Model A |</a:t>
+                <a:t>A |</a:t>
               </a:r>
               <a:r>
                 <a:rPr lang="en-US" altLang="en-US" sz="1400" b="1" i="1">
@@ -18624,7 +20772,18 @@
                   </a:solidFill>
                   <a:sym typeface="+mn-ea"/>
                 </a:rPr>
-                <a:t>Model B |</a:t>
+                <a:t>Model </a:t>
+              </a:r>
+              <a:r>
+                <a:rPr lang="en-US" altLang="en-US" sz="1400" b="1" i="1">
+                  <a:solidFill>
+                    <a:schemeClr val="bg2">
+                      <a:lumMod val="50000"/>
+                    </a:schemeClr>
+                  </a:solidFill>
+                  <a:sym typeface="+mn-ea"/>
+                </a:rPr>
+                <a:t>B |</a:t>
               </a:r>
               <a:r>
                 <a:rPr lang="en-US" altLang="en-US" sz="1400" b="1" i="1">
@@ -18656,7 +20815,18 @@
                   </a:solidFill>
                   <a:sym typeface="+mn-ea"/>
                 </a:rPr>
-                <a:t>Model C |</a:t>
+                <a:t>Model </a:t>
+              </a:r>
+              <a:r>
+                <a:rPr lang="en-US" altLang="en-US" sz="1400" b="1" i="1">
+                  <a:solidFill>
+                    <a:schemeClr val="bg2">
+                      <a:lumMod val="50000"/>
+                    </a:schemeClr>
+                  </a:solidFill>
+                  <a:sym typeface="+mn-ea"/>
+                </a:rPr>
+                <a:t>C |</a:t>
               </a:r>
               <a:r>
                 <a:rPr lang="en-US" altLang="en-US" sz="1400" b="1" i="1">
@@ -18688,8 +20858,8 @@
           </p:nvSpPr>
           <p:spPr>
             <a:xfrm>
-              <a:off x="11646" y="8224"/>
-              <a:ext cx="2791" cy="1298"/>
+              <a:off x="11469" y="8224"/>
+              <a:ext cx="3274" cy="1298"/>
             </a:xfrm>
             <a:prstGeom prst="rect">
               <a:avLst/>
@@ -18710,7 +20880,18 @@
                   </a:solidFill>
                   <a:sym typeface="+mn-ea"/>
                 </a:rPr>
-                <a:t>Model A |</a:t>
+                <a:t>Model </a:t>
+              </a:r>
+              <a:r>
+                <a:rPr lang="en-US" altLang="en-US" sz="1400" b="1" i="1">
+                  <a:solidFill>
+                    <a:schemeClr val="bg2">
+                      <a:lumMod val="50000"/>
+                    </a:schemeClr>
+                  </a:solidFill>
+                  <a:sym typeface="+mn-ea"/>
+                </a:rPr>
+                <a:t>A |</a:t>
               </a:r>
               <a:r>
                 <a:rPr lang="en-US" altLang="en-US" sz="1400" b="1" i="1">
@@ -18742,7 +20923,18 @@
                   </a:solidFill>
                   <a:sym typeface="+mn-ea"/>
                 </a:rPr>
-                <a:t>Model B |</a:t>
+                <a:t>Model </a:t>
+              </a:r>
+              <a:r>
+                <a:rPr lang="en-US" altLang="en-US" sz="1400" b="1" i="1">
+                  <a:solidFill>
+                    <a:schemeClr val="bg2">
+                      <a:lumMod val="50000"/>
+                    </a:schemeClr>
+                  </a:solidFill>
+                  <a:sym typeface="+mn-ea"/>
+                </a:rPr>
+                <a:t>B |</a:t>
               </a:r>
               <a:r>
                 <a:rPr lang="en-US" altLang="en-US" sz="1400" b="1" i="1">
@@ -18774,7 +20966,18 @@
                   </a:solidFill>
                   <a:sym typeface="+mn-ea"/>
                 </a:rPr>
-                <a:t>Model C |</a:t>
+                <a:t>Model </a:t>
+              </a:r>
+              <a:r>
+                <a:rPr lang="en-US" altLang="en-US" sz="1400" b="1" i="1">
+                  <a:solidFill>
+                    <a:schemeClr val="bg2">
+                      <a:lumMod val="50000"/>
+                    </a:schemeClr>
+                  </a:solidFill>
+                  <a:sym typeface="+mn-ea"/>
+                </a:rPr>
+                <a:t>C |</a:t>
               </a:r>
               <a:r>
                 <a:rPr lang="en-US" altLang="en-US" sz="1400" b="1" i="1">
@@ -18806,8 +21009,8 @@
         </p:nvSpPr>
         <p:spPr>
           <a:xfrm>
-            <a:off x="10028555" y="4094480"/>
-            <a:ext cx="1861185" cy="1198880"/>
+            <a:off x="10334625" y="3669665"/>
+            <a:ext cx="1861185" cy="953135"/>
           </a:xfrm>
           <a:prstGeom prst="rect">
             <a:avLst/>
@@ -18821,17 +21024,28 @@
           <a:p>
             <a:pPr algn="ctr"/>
             <a:r>
-              <a:rPr lang="en-US" altLang="en-US" b="1" i="1">
+              <a:rPr lang="en-US" altLang="en-US" sz="1400" b="1" i="1">
                 <a:solidFill>
                   <a:schemeClr val="bg2">
                     <a:lumMod val="50000"/>
                   </a:schemeClr>
                 </a:solidFill>
+                <a:sym typeface="+mn-ea"/>
               </a:rPr>
-              <a:t>Model A |</a:t>
+              <a:t>Model </a:t>
             </a:r>
             <a:r>
-              <a:rPr lang="en-US" altLang="en-US" b="1" i="1">
+              <a:rPr lang="en-US" altLang="en-US" sz="1400" b="1" i="1">
+                <a:solidFill>
+                  <a:schemeClr val="bg2">
+                    <a:lumMod val="50000"/>
+                  </a:schemeClr>
+                </a:solidFill>
+              </a:rPr>
+              <a:t>A |</a:t>
+            </a:r>
+            <a:r>
+              <a:rPr lang="en-US" altLang="en-US" sz="1400" b="1" i="1">
                 <a:solidFill>
                   <a:schemeClr val="accent2">
                     <a:lumMod val="75000"/>
@@ -18840,7 +21054,7 @@
               </a:rPr>
               <a:t> perf</a:t>
             </a:r>
-            <a:endParaRPr lang="en-US" altLang="en-US" b="1" i="1">
+            <a:endParaRPr lang="en-US" altLang="en-US" sz="1400" b="1" i="1">
               <a:solidFill>
                 <a:schemeClr val="accent2">
                   <a:lumMod val="75000"/>
@@ -18851,17 +21065,28 @@
           <a:p>
             <a:pPr algn="ctr"/>
             <a:r>
-              <a:rPr lang="en-US" altLang="en-US" b="1" i="1">
+              <a:rPr lang="en-US" altLang="en-US" sz="1400" b="1" i="1">
                 <a:solidFill>
                   <a:schemeClr val="bg2">
                     <a:lumMod val="50000"/>
                   </a:schemeClr>
                 </a:solidFill>
+                <a:sym typeface="+mn-ea"/>
               </a:rPr>
-              <a:t>Model B |</a:t>
+              <a:t>Model </a:t>
             </a:r>
             <a:r>
-              <a:rPr lang="en-US" altLang="en-US" b="1" i="1">
+              <a:rPr lang="en-US" altLang="en-US" sz="1400" b="1" i="1">
+                <a:solidFill>
+                  <a:schemeClr val="bg2">
+                    <a:lumMod val="50000"/>
+                  </a:schemeClr>
+                </a:solidFill>
+              </a:rPr>
+              <a:t>B |</a:t>
+            </a:r>
+            <a:r>
+              <a:rPr lang="en-US" altLang="en-US" sz="1400" b="1" i="1">
                 <a:solidFill>
                   <a:schemeClr val="accent2">
                     <a:lumMod val="75000"/>
@@ -18870,7 +21095,7 @@
               </a:rPr>
               <a:t> perf</a:t>
             </a:r>
-            <a:endParaRPr lang="en-US" altLang="en-US" b="1" i="1">
+            <a:endParaRPr lang="en-US" altLang="en-US" sz="1400" b="1" i="1">
               <a:solidFill>
                 <a:schemeClr val="accent2">
                   <a:lumMod val="75000"/>
@@ -18881,17 +21106,28 @@
           <a:p>
             <a:pPr algn="ctr"/>
             <a:r>
-              <a:rPr lang="en-US" altLang="en-US" b="1" i="1">
+              <a:rPr lang="en-US" altLang="en-US" sz="1400" b="1" i="1">
                 <a:solidFill>
                   <a:schemeClr val="bg2">
                     <a:lumMod val="50000"/>
                   </a:schemeClr>
                 </a:solidFill>
+                <a:sym typeface="+mn-ea"/>
               </a:rPr>
-              <a:t>Model C |</a:t>
+              <a:t>Model </a:t>
             </a:r>
             <a:r>
-              <a:rPr lang="en-US" altLang="en-US" b="1" i="1">
+              <a:rPr lang="en-US" altLang="en-US" sz="1400" b="1" i="1">
+                <a:solidFill>
+                  <a:schemeClr val="bg2">
+                    <a:lumMod val="50000"/>
+                  </a:schemeClr>
+                </a:solidFill>
+              </a:rPr>
+              <a:t>C |</a:t>
+            </a:r>
+            <a:r>
+              <a:rPr lang="en-US" altLang="en-US" sz="1400" b="1" i="1">
                 <a:solidFill>
                   <a:schemeClr val="accent2">
                     <a:lumMod val="75000"/>
@@ -18900,7 +21136,7 @@
               </a:rPr>
               <a:t> perf</a:t>
             </a:r>
-            <a:endParaRPr lang="en-US" altLang="en-US" b="1" i="1">
+            <a:endParaRPr lang="en-US" altLang="en-US" sz="1400" b="1" i="1">
               <a:solidFill>
                 <a:schemeClr val="accent2">
                   <a:lumMod val="75000"/>
@@ -18911,7 +21147,7 @@
           <a:p>
             <a:pPr algn="ctr"/>
             <a:r>
-              <a:rPr lang="en-US" altLang="en-US" b="1" i="1">
+              <a:rPr lang="en-US" altLang="en-US" sz="1400" b="1" i="1">
                 <a:solidFill>
                   <a:schemeClr val="accent2">
                     <a:lumMod val="75000"/>
@@ -18920,7 +21156,7 @@
               </a:rPr>
               <a:t>(average)</a:t>
             </a:r>
-            <a:endParaRPr lang="en-US" altLang="en-US" b="1" i="1">
+            <a:endParaRPr lang="en-US" altLang="en-US" sz="1400" b="1" i="1">
               <a:solidFill>
                 <a:schemeClr val="accent2">
                   <a:lumMod val="75000"/>
@@ -18938,7 +21174,7 @@
         </p:nvSpPr>
         <p:spPr>
           <a:xfrm>
-            <a:off x="603250" y="445135"/>
+            <a:off x="603250" y="502920"/>
             <a:ext cx="6192520" cy="710565"/>
           </a:xfrm>
           <a:prstGeom prst="roundRect">
@@ -19009,7 +21245,7 @@
         </p:nvSpPr>
         <p:spPr>
           <a:xfrm rot="16200000">
-            <a:off x="-72390" y="3181985"/>
+            <a:off x="-72390" y="2613025"/>
             <a:ext cx="697230" cy="306705"/>
           </a:xfrm>
           <a:prstGeom prst="rect">
@@ -19052,7 +21288,7 @@
         </p:nvSpPr>
         <p:spPr>
           <a:xfrm rot="16200000">
-            <a:off x="-72390" y="4005580"/>
+            <a:off x="-72390" y="3436620"/>
             <a:ext cx="697230" cy="306705"/>
           </a:xfrm>
           <a:prstGeom prst="rect">
@@ -19095,7 +21331,7 @@
         </p:nvSpPr>
         <p:spPr>
           <a:xfrm rot="16200000">
-            <a:off x="-72390" y="4862830"/>
+            <a:off x="-72390" y="4293870"/>
             <a:ext cx="697230" cy="306705"/>
           </a:xfrm>
           <a:prstGeom prst="rect">
@@ -19138,7 +21374,7 @@
         </p:nvSpPr>
         <p:spPr>
           <a:xfrm rot="16200000">
-            <a:off x="-72390" y="5723890"/>
+            <a:off x="-72390" y="5154930"/>
             <a:ext cx="697230" cy="306705"/>
           </a:xfrm>
           <a:prstGeom prst="rect">
@@ -19167,6 +21403,253 @@
                 <a:schemeClr val="accent1">
                   <a:lumMod val="50000"/>
                 </a:schemeClr>
+              </a:solidFill>
+              <a:sym typeface="+mn-ea"/>
+            </a:endParaRPr>
+          </a:p>
+        </p:txBody>
+      </p:sp>
+      <p:sp>
+        <p:nvSpPr>
+          <p:cNvPr id="14" name="Down Arrow 13"/>
+          <p:cNvSpPr/>
+          <p:nvPr/>
+        </p:nvSpPr>
+        <p:spPr>
+          <a:xfrm rot="10800000">
+            <a:off x="10979785" y="2755900"/>
+            <a:ext cx="571500" cy="812800"/>
+          </a:xfrm>
+          <a:prstGeom prst="downArrow">
+            <a:avLst/>
+          </a:prstGeom>
+          <a:noFill/>
+          <a:ln w="50800">
+            <a:solidFill>
+              <a:srgbClr val="C39BE1"/>
+            </a:solidFill>
+          </a:ln>
+        </p:spPr>
+        <p:style>
+          <a:lnRef idx="2">
+            <a:schemeClr val="accent1">
+              <a:shade val="50000"/>
+            </a:schemeClr>
+          </a:lnRef>
+          <a:fillRef idx="1">
+            <a:schemeClr val="accent1"/>
+          </a:fillRef>
+          <a:effectRef idx="0">
+            <a:schemeClr val="accent1"/>
+          </a:effectRef>
+          <a:fontRef idx="minor">
+            <a:schemeClr val="lt1"/>
+          </a:fontRef>
+        </p:style>
+        <p:txBody>
+          <a:bodyPr rtlCol="0" anchor="ctr"/>
+          <a:p>
+            <a:pPr algn="ctr"/>
+            <a:endParaRPr lang="en-US"/>
+          </a:p>
+        </p:txBody>
+      </p:sp>
+      <p:sp>
+        <p:nvSpPr>
+          <p:cNvPr id="31" name="Rectangle 30"/>
+          <p:cNvSpPr/>
+          <p:nvPr/>
+        </p:nvSpPr>
+        <p:spPr>
+          <a:xfrm>
+            <a:off x="10510520" y="1892935"/>
+            <a:ext cx="1509395" cy="721360"/>
+          </a:xfrm>
+          <a:prstGeom prst="rect">
+            <a:avLst/>
+          </a:prstGeom>
+          <a:solidFill>
+            <a:srgbClr val="BC90DE"/>
+          </a:solidFill>
+          <a:ln>
+            <a:noFill/>
+          </a:ln>
+        </p:spPr>
+        <p:style>
+          <a:lnRef idx="2">
+            <a:schemeClr val="accent1">
+              <a:shade val="50000"/>
+            </a:schemeClr>
+          </a:lnRef>
+          <a:fillRef idx="1">
+            <a:schemeClr val="accent1"/>
+          </a:fillRef>
+          <a:effectRef idx="0">
+            <a:schemeClr val="accent1"/>
+          </a:effectRef>
+          <a:fontRef idx="minor">
+            <a:schemeClr val="lt1"/>
+          </a:fontRef>
+        </p:style>
+        <p:txBody>
+          <a:bodyPr rtlCol="0" anchor="ctr"/>
+          <a:p>
+            <a:pPr algn="ctr"/>
+            <a:r>
+              <a:rPr lang="en-US" altLang="en-US" b="1"/>
+              <a:t>SELECT BEST</a:t>
+            </a:r>
+            <a:endParaRPr lang="en-US" altLang="en-US" b="1"/>
+          </a:p>
+        </p:txBody>
+      </p:sp>
+      <p:sp>
+        <p:nvSpPr>
+          <p:cNvPr id="10" name="Rounded Rectangle 9"/>
+          <p:cNvSpPr/>
+          <p:nvPr/>
+        </p:nvSpPr>
+        <p:spPr>
+          <a:xfrm>
+            <a:off x="6930390" y="502920"/>
+            <a:ext cx="1692910" cy="710565"/>
+          </a:xfrm>
+          <a:prstGeom prst="roundRect">
+            <a:avLst/>
+          </a:prstGeom>
+          <a:solidFill>
+            <a:srgbClr val="FA7C7C"/>
+          </a:solidFill>
+          <a:ln w="50800" cmpd="sng">
+            <a:solidFill>
+              <a:srgbClr val="AD4545"/>
+            </a:solidFill>
+            <a:prstDash val="solid"/>
+          </a:ln>
+        </p:spPr>
+        <p:style>
+          <a:lnRef idx="2">
+            <a:schemeClr val="accent1">
+              <a:shade val="50000"/>
+            </a:schemeClr>
+          </a:lnRef>
+          <a:fillRef idx="1">
+            <a:schemeClr val="accent1"/>
+          </a:fillRef>
+          <a:effectRef idx="0">
+            <a:schemeClr val="accent1"/>
+          </a:effectRef>
+          <a:fontRef idx="minor">
+            <a:schemeClr val="lt1"/>
+          </a:fontRef>
+        </p:style>
+        <p:txBody>
+          <a:bodyPr rtlCol="0" anchor="ctr"/>
+          <a:p>
+            <a:pPr algn="ctr"/>
+            <a:r>
+              <a:rPr lang="en-US" altLang="en-US" b="1">
+                <a:solidFill>
+                  <a:srgbClr val="863636"/>
+                </a:solidFill>
+                <a:sym typeface="+mn-ea"/>
+              </a:rPr>
+              <a:t>TEST</a:t>
+            </a:r>
+            <a:endParaRPr lang="en-US" altLang="en-US" b="1">
+              <a:solidFill>
+                <a:srgbClr val="863636"/>
+              </a:solidFill>
+              <a:sym typeface="+mn-ea"/>
+            </a:endParaRPr>
+          </a:p>
+        </p:txBody>
+      </p:sp>
+      <p:sp>
+        <p:nvSpPr>
+          <p:cNvPr id="11" name="Bent Arrow 10"/>
+          <p:cNvSpPr/>
+          <p:nvPr/>
+        </p:nvSpPr>
+        <p:spPr>
+          <a:xfrm flipH="1">
+            <a:off x="8846820" y="578485"/>
+            <a:ext cx="2554605" cy="1143635"/>
+          </a:xfrm>
+          <a:prstGeom prst="bentArrow">
+            <a:avLst/>
+          </a:prstGeom>
+          <a:solidFill>
+            <a:srgbClr val="FA7C7C"/>
+          </a:solidFill>
+          <a:ln w="50800" cmpd="sng">
+            <a:solidFill>
+              <a:srgbClr val="AD4545"/>
+            </a:solidFill>
+            <a:prstDash val="solid"/>
+          </a:ln>
+        </p:spPr>
+        <p:style>
+          <a:lnRef idx="2">
+            <a:schemeClr val="accent1">
+              <a:shade val="50000"/>
+            </a:schemeClr>
+          </a:lnRef>
+          <a:fillRef idx="1">
+            <a:schemeClr val="accent1"/>
+          </a:fillRef>
+          <a:effectRef idx="0">
+            <a:schemeClr val="accent1"/>
+          </a:effectRef>
+          <a:fontRef idx="minor">
+            <a:schemeClr val="lt1"/>
+          </a:fontRef>
+        </p:style>
+        <p:txBody>
+          <a:bodyPr rtlCol="0" anchor="ctr"/>
+          <a:p>
+            <a:pPr algn="ctr"/>
+            <a:endParaRPr lang="en-US">
+              <a:solidFill>
+                <a:schemeClr val="tx1"/>
+              </a:solidFill>
+            </a:endParaRPr>
+          </a:p>
+        </p:txBody>
+      </p:sp>
+      <p:sp>
+        <p:nvSpPr>
+          <p:cNvPr id="13" name="Text Box 12"/>
+          <p:cNvSpPr txBox="1"/>
+          <p:nvPr/>
+        </p:nvSpPr>
+        <p:spPr>
+          <a:xfrm>
+            <a:off x="9632950" y="1213485"/>
+            <a:ext cx="982980" cy="368300"/>
+          </a:xfrm>
+          <a:prstGeom prst="rect">
+            <a:avLst/>
+          </a:prstGeom>
+          <a:noFill/>
+        </p:spPr>
+        <p:txBody>
+          <a:bodyPr wrap="none" rtlCol="0" anchor="t">
+            <a:spAutoFit/>
+          </a:bodyPr>
+          <a:p>
+            <a:r>
+              <a:rPr lang="" altLang="en-US" b="1" i="1">
+                <a:solidFill>
+                  <a:srgbClr val="AD4545"/>
+                </a:solidFill>
+                <a:sym typeface="+mn-ea"/>
+              </a:rPr>
+              <a:t>Assess</a:t>
+            </a:r>
+            <a:endParaRPr lang="" altLang="en-US" b="1" i="1">
+              <a:solidFill>
+                <a:srgbClr val="AD4545"/>
               </a:solidFill>
               <a:sym typeface="+mn-ea"/>
             </a:endParaRPr>

</xml_diff>